<commit_message>
clarified discussion of ambiguous grammars
</commit_message>
<xml_diff>
--- a/PowerPoint Slides/03 - Context-Free Grammars.pptx
+++ b/PowerPoint Slides/03 - Context-Free Grammars.pptx
@@ -5,10 +5,10 @@
     <p:sldMasterId id="2147483651" r:id="rId1"/>
   </p:sldMasterIdLst>
   <p:notesMasterIdLst>
-    <p:notesMasterId r:id="rId42"/>
+    <p:notesMasterId r:id="rId43"/>
   </p:notesMasterIdLst>
   <p:handoutMasterIdLst>
-    <p:handoutMasterId r:id="rId43"/>
+    <p:handoutMasterId r:id="rId44"/>
   </p:handoutMasterIdLst>
   <p:sldIdLst>
     <p:sldId id="256" r:id="rId2"/>
@@ -44,16 +44,17 @@
     <p:sldId id="274" r:id="rId32"/>
     <p:sldId id="281" r:id="rId33"/>
     <p:sldId id="285" r:id="rId34"/>
-    <p:sldId id="298" r:id="rId35"/>
-    <p:sldId id="282" r:id="rId36"/>
-    <p:sldId id="303" r:id="rId37"/>
-    <p:sldId id="304" r:id="rId38"/>
-    <p:sldId id="280" r:id="rId39"/>
-    <p:sldId id="287" r:id="rId40"/>
-    <p:sldId id="301" r:id="rId41"/>
+    <p:sldId id="305" r:id="rId35"/>
+    <p:sldId id="298" r:id="rId36"/>
+    <p:sldId id="282" r:id="rId37"/>
+    <p:sldId id="303" r:id="rId38"/>
+    <p:sldId id="304" r:id="rId39"/>
+    <p:sldId id="280" r:id="rId40"/>
+    <p:sldId id="287" r:id="rId41"/>
+    <p:sldId id="301" r:id="rId42"/>
   </p:sldIdLst>
   <p:sldSz cx="9144000" cy="6858000" type="screen4x3"/>
-  <p:notesSz cx="7010400" cy="9296400"/>
+  <p:notesSz cx="7315200" cy="9601200"/>
   <p:defaultTextStyle>
     <a:defPPr>
       <a:defRPr lang="en-US"/>
@@ -196,12 +197,12 @@
     </p:ext>
     <p:ext uri="{2D200454-40CA-4A62-9FC3-DE9A4176ACB9}">
       <p15:notesGuideLst xmlns:p15="http://schemas.microsoft.com/office/powerpoint/2012/main">
-        <p15:guide id="1" orient="horz" pos="2928" userDrawn="1">
+        <p15:guide id="1" orient="horz" pos="3024" userDrawn="1">
           <p15:clr>
             <a:srgbClr val="A4A3A4"/>
           </p15:clr>
         </p15:guide>
-        <p15:guide id="2" pos="2208" userDrawn="1">
+        <p15:guide id="2" pos="2305" userDrawn="1">
           <p15:clr>
             <a:srgbClr val="A4A3A4"/>
           </p15:clr>
@@ -249,8 +250,8 @@
         </p:nvSpPr>
         <p:spPr bwMode="auto">
           <a:xfrm>
-            <a:off x="3971926" y="0"/>
-            <a:ext cx="3038475" cy="465138"/>
+            <a:off x="4144619" y="0"/>
+            <a:ext cx="3170582" cy="480388"/>
           </a:xfrm>
           <a:prstGeom prst="rect">
             <a:avLst/>
@@ -265,14 +266,14 @@
           <a:effectLst/>
         </p:spPr>
         <p:txBody>
-          <a:bodyPr vert="horz" wrap="square" lIns="93164" tIns="46582" rIns="93164" bIns="46582" numCol="1" anchor="t" anchorCtr="0" compatLnSpc="1">
+          <a:bodyPr vert="horz" wrap="square" lIns="97412" tIns="48706" rIns="97412" bIns="48706" numCol="1" anchor="t" anchorCtr="0" compatLnSpc="1">
             <a:prstTxWarp prst="textNoShape">
               <a:avLst/>
             </a:prstTxWarp>
           </a:bodyPr>
           <a:lstStyle>
-            <a:lvl1pPr algn="r" defTabSz="931726">
-              <a:defRPr sz="1200"/>
+            <a:lvl1pPr algn="r" defTabSz="974213">
+              <a:defRPr sz="1300"/>
             </a:lvl1pPr>
           </a:lstStyle>
           <a:p>
@@ -280,7 +281,7 @@
               <a:defRPr/>
             </a:pPr>
             <a:r>
-              <a:rPr lang="en-US" sz="1100" dirty="0">
+              <a:rPr lang="en-US" sz="1200" dirty="0">
                 <a:latin typeface="+mn-lt"/>
               </a:rPr>
               <a:t>Context-Free Grammars</a:t>
@@ -300,8 +301,8 @@
         </p:nvSpPr>
         <p:spPr bwMode="auto">
           <a:xfrm>
-            <a:off x="3971926" y="8831264"/>
-            <a:ext cx="3038475" cy="465137"/>
+            <a:off x="4144619" y="9120815"/>
+            <a:ext cx="3170582" cy="480387"/>
           </a:xfrm>
           <a:prstGeom prst="rect">
             <a:avLst/>
@@ -316,14 +317,14 @@
           <a:effectLst/>
         </p:spPr>
         <p:txBody>
-          <a:bodyPr vert="horz" wrap="square" lIns="93164" tIns="46582" rIns="93164" bIns="46582" numCol="1" anchor="b" anchorCtr="0" compatLnSpc="1">
+          <a:bodyPr vert="horz" wrap="square" lIns="97412" tIns="48706" rIns="97412" bIns="48706" numCol="1" anchor="b" anchorCtr="0" compatLnSpc="1">
             <a:prstTxWarp prst="textNoShape">
               <a:avLst/>
             </a:prstTxWarp>
           </a:bodyPr>
           <a:lstStyle>
-            <a:lvl1pPr algn="r" defTabSz="931726">
-              <a:defRPr sz="1200"/>
+            <a:lvl1pPr algn="r" defTabSz="974213">
+              <a:defRPr sz="1300"/>
             </a:lvl1pPr>
           </a:lstStyle>
           <a:p>
@@ -331,13 +332,13 @@
               <a:defRPr/>
             </a:pPr>
             <a:r>
-              <a:rPr lang="en-US" sz="1100">
+              <a:rPr lang="en-US" sz="1200">
                 <a:latin typeface="+mn-lt"/>
               </a:rPr>
               <a:t>3-</a:t>
             </a:r>
             <a:fld id="{B8CBD4AD-CFA2-47F1-9E91-5AE6CCFFFBD3}" type="slidenum">
-              <a:rPr lang="en-US" sz="1100">
+              <a:rPr lang="en-US" sz="1200">
                 <a:latin typeface="+mn-lt"/>
               </a:rPr>
               <a:pPr>
@@ -345,7 +346,7 @@
               </a:pPr>
               <a:t>‹#›</a:t>
             </a:fld>
-            <a:endParaRPr lang="en-US" sz="1100">
+            <a:endParaRPr lang="en-US" sz="1200">
               <a:latin typeface="+mn-lt"/>
             </a:endParaRPr>
           </a:p>
@@ -399,8 +400,8 @@
         </p:nvSpPr>
         <p:spPr bwMode="auto">
           <a:xfrm>
-            <a:off x="1" y="0"/>
-            <a:ext cx="3038475" cy="465138"/>
+            <a:off x="2" y="0"/>
+            <a:ext cx="3170582" cy="480388"/>
           </a:xfrm>
           <a:prstGeom prst="rect">
             <a:avLst/>
@@ -415,14 +416,14 @@
           <a:effectLst/>
         </p:spPr>
         <p:txBody>
-          <a:bodyPr vert="horz" wrap="square" lIns="93164" tIns="46582" rIns="93164" bIns="46582" numCol="1" anchor="t" anchorCtr="0" compatLnSpc="1">
+          <a:bodyPr vert="horz" wrap="square" lIns="97412" tIns="48706" rIns="97412" bIns="48706" numCol="1" anchor="t" anchorCtr="0" compatLnSpc="1">
             <a:prstTxWarp prst="textNoShape">
               <a:avLst/>
             </a:prstTxWarp>
           </a:bodyPr>
           <a:lstStyle>
-            <a:lvl1pPr defTabSz="931726">
-              <a:defRPr sz="1200"/>
+            <a:lvl1pPr defTabSz="974213">
+              <a:defRPr sz="1300"/>
             </a:lvl1pPr>
           </a:lstStyle>
           <a:p>
@@ -448,8 +449,8 @@
         </p:nvSpPr>
         <p:spPr bwMode="auto">
           <a:xfrm>
-            <a:off x="3971926" y="0"/>
-            <a:ext cx="3038475" cy="465138"/>
+            <a:off x="4144619" y="0"/>
+            <a:ext cx="3170582" cy="480388"/>
           </a:xfrm>
           <a:prstGeom prst="rect">
             <a:avLst/>
@@ -464,14 +465,14 @@
           <a:effectLst/>
         </p:spPr>
         <p:txBody>
-          <a:bodyPr vert="horz" wrap="square" lIns="93164" tIns="46582" rIns="93164" bIns="46582" numCol="1" anchor="t" anchorCtr="0" compatLnSpc="1">
+          <a:bodyPr vert="horz" wrap="square" lIns="97412" tIns="48706" rIns="97412" bIns="48706" numCol="1" anchor="t" anchorCtr="0" compatLnSpc="1">
             <a:prstTxWarp prst="textNoShape">
               <a:avLst/>
             </a:prstTxWarp>
           </a:bodyPr>
           <a:lstStyle>
-            <a:lvl1pPr algn="r" defTabSz="931726">
-              <a:defRPr sz="1200"/>
+            <a:lvl1pPr algn="r" defTabSz="974213">
+              <a:defRPr sz="1300"/>
             </a:lvl1pPr>
           </a:lstStyle>
           <a:p>
@@ -494,8 +495,8 @@
         </p:nvSpPr>
         <p:spPr bwMode="auto">
           <a:xfrm>
-            <a:off x="1181100" y="696913"/>
-            <a:ext cx="4648200" cy="3486150"/>
+            <a:off x="1257300" y="719138"/>
+            <a:ext cx="4800600" cy="3600450"/>
           </a:xfrm>
           <a:prstGeom prst="rect">
             <a:avLst/>
@@ -523,8 +524,8 @@
         </p:nvSpPr>
         <p:spPr bwMode="auto">
           <a:xfrm>
-            <a:off x="935039" y="4416426"/>
-            <a:ext cx="5140325" cy="4183063"/>
+            <a:off x="975693" y="4561228"/>
+            <a:ext cx="5363818" cy="4320213"/>
           </a:xfrm>
           <a:prstGeom prst="rect">
             <a:avLst/>
@@ -539,7 +540,7 @@
           <a:effectLst/>
         </p:spPr>
         <p:txBody>
-          <a:bodyPr vert="horz" wrap="square" lIns="93164" tIns="46582" rIns="93164" bIns="46582" numCol="1" anchor="t" anchorCtr="0" compatLnSpc="1">
+          <a:bodyPr vert="horz" wrap="square" lIns="97412" tIns="48706" rIns="97412" bIns="48706" numCol="1" anchor="t" anchorCtr="0" compatLnSpc="1">
             <a:prstTxWarp prst="textNoShape">
               <a:avLst/>
             </a:prstTxWarp>
@@ -594,8 +595,8 @@
         </p:nvSpPr>
         <p:spPr bwMode="auto">
           <a:xfrm>
-            <a:off x="1" y="8831264"/>
-            <a:ext cx="3038475" cy="465137"/>
+            <a:off x="2" y="9120815"/>
+            <a:ext cx="3170582" cy="480387"/>
           </a:xfrm>
           <a:prstGeom prst="rect">
             <a:avLst/>
@@ -610,14 +611,14 @@
           <a:effectLst/>
         </p:spPr>
         <p:txBody>
-          <a:bodyPr vert="horz" wrap="square" lIns="93164" tIns="46582" rIns="93164" bIns="46582" numCol="1" anchor="b" anchorCtr="0" compatLnSpc="1">
+          <a:bodyPr vert="horz" wrap="square" lIns="97412" tIns="48706" rIns="97412" bIns="48706" numCol="1" anchor="b" anchorCtr="0" compatLnSpc="1">
             <a:prstTxWarp prst="textNoShape">
               <a:avLst/>
             </a:prstTxWarp>
           </a:bodyPr>
           <a:lstStyle>
-            <a:lvl1pPr defTabSz="931726">
-              <a:defRPr sz="1200"/>
+            <a:lvl1pPr defTabSz="974213">
+              <a:defRPr sz="1300"/>
             </a:lvl1pPr>
           </a:lstStyle>
           <a:p>
@@ -640,8 +641,8 @@
         </p:nvSpPr>
         <p:spPr bwMode="auto">
           <a:xfrm>
-            <a:off x="3971926" y="8831264"/>
-            <a:ext cx="3038475" cy="465137"/>
+            <a:off x="4144619" y="9120815"/>
+            <a:ext cx="3170582" cy="480387"/>
           </a:xfrm>
           <a:prstGeom prst="rect">
             <a:avLst/>
@@ -656,14 +657,14 @@
           <a:effectLst/>
         </p:spPr>
         <p:txBody>
-          <a:bodyPr vert="horz" wrap="square" lIns="93164" tIns="46582" rIns="93164" bIns="46582" numCol="1" anchor="b" anchorCtr="0" compatLnSpc="1">
+          <a:bodyPr vert="horz" wrap="square" lIns="97412" tIns="48706" rIns="97412" bIns="48706" numCol="1" anchor="b" anchorCtr="0" compatLnSpc="1">
             <a:prstTxWarp prst="textNoShape">
               <a:avLst/>
             </a:prstTxWarp>
           </a:bodyPr>
           <a:lstStyle>
-            <a:lvl1pPr algn="r" defTabSz="931726">
-              <a:defRPr sz="1200"/>
+            <a:lvl1pPr algn="r" defTabSz="974213">
+              <a:defRPr sz="1300"/>
             </a:lvl1pPr>
           </a:lstStyle>
           <a:p>
@@ -3402,7 +3403,7 @@
     </p:spTree>
     <p:extLst>
       <p:ext uri="{BB962C8B-B14F-4D97-AF65-F5344CB8AC3E}">
-        <p14:creationId xmlns:p14="http://schemas.microsoft.com/office/powerpoint/2010/main" val="4019866396"/>
+        <p14:creationId xmlns:p14="http://schemas.microsoft.com/office/powerpoint/2010/main" val="986722982"/>
       </p:ext>
     </p:extLst>
   </p:cSld>
@@ -3549,7 +3550,7 @@
       </p:grpSpPr>
       <p:sp>
         <p:nvSpPr>
-          <p:cNvPr id="68610" name="Slide Image Placeholder 1"/>
+          <p:cNvPr id="67586" name="Slide Image Placeholder 1"/>
           <p:cNvSpPr>
             <a:spLocks noGrp="1" noRot="1" noChangeAspect="1" noTextEdit="1"/>
           </p:cNvSpPr>
@@ -3563,7 +3564,7 @@
       </p:sp>
       <p:sp>
         <p:nvSpPr>
-          <p:cNvPr id="68611" name="Notes Placeholder 2"/>
+          <p:cNvPr id="67587" name="Notes Placeholder 2"/>
           <p:cNvSpPr>
             <a:spLocks noGrp="1"/>
           </p:cNvSpPr>
@@ -3587,7 +3588,7 @@
       </p:sp>
       <p:sp>
         <p:nvSpPr>
-          <p:cNvPr id="68612" name="Header Placeholder 3"/>
+          <p:cNvPr id="67588" name="Header Placeholder 3"/>
           <p:cNvSpPr>
             <a:spLocks noGrp="1"/>
           </p:cNvSpPr>
@@ -3611,7 +3612,7 @@
       </p:sp>
       <p:sp>
         <p:nvSpPr>
-          <p:cNvPr id="68613" name="Slide Number Placeholder 4"/>
+          <p:cNvPr id="67589" name="Slide Number Placeholder 4"/>
           <p:cNvSpPr>
             <a:spLocks noGrp="1"/>
           </p:cNvSpPr>
@@ -3626,7 +3627,7 @@
           <a:bodyPr/>
           <a:lstStyle/>
           <a:p>
-            <a:fld id="{85CBAAD0-137E-4FAF-82D1-BF2D7E98B31C}" type="slidenum">
+            <a:fld id="{8AA24CFD-3DEC-492E-8702-B950455E79C2}" type="slidenum">
               <a:rPr lang="en-US" smtClean="0"/>
               <a:pPr/>
               <a:t>35</a:t>
@@ -3638,7 +3639,7 @@
     </p:spTree>
     <p:extLst>
       <p:ext uri="{BB962C8B-B14F-4D97-AF65-F5344CB8AC3E}">
-        <p14:creationId xmlns:p14="http://schemas.microsoft.com/office/powerpoint/2010/main" val="679541623"/>
+        <p14:creationId xmlns:p14="http://schemas.microsoft.com/office/powerpoint/2010/main" val="4019866396"/>
       </p:ext>
     </p:extLst>
   </p:cSld>
@@ -3667,7 +3668,7 @@
       </p:grpSpPr>
       <p:sp>
         <p:nvSpPr>
-          <p:cNvPr id="70658" name="Slide Image Placeholder 1"/>
+          <p:cNvPr id="68610" name="Slide Image Placeholder 1"/>
           <p:cNvSpPr>
             <a:spLocks noGrp="1" noRot="1" noChangeAspect="1" noTextEdit="1"/>
           </p:cNvSpPr>
@@ -3681,7 +3682,7 @@
       </p:sp>
       <p:sp>
         <p:nvSpPr>
-          <p:cNvPr id="70659" name="Notes Placeholder 2"/>
+          <p:cNvPr id="68611" name="Notes Placeholder 2"/>
           <p:cNvSpPr>
             <a:spLocks noGrp="1"/>
           </p:cNvSpPr>
@@ -3705,7 +3706,7 @@
       </p:sp>
       <p:sp>
         <p:nvSpPr>
-          <p:cNvPr id="70660" name="Header Placeholder 3"/>
+          <p:cNvPr id="68612" name="Header Placeholder 3"/>
           <p:cNvSpPr>
             <a:spLocks noGrp="1"/>
           </p:cNvSpPr>
@@ -3729,7 +3730,7 @@
       </p:sp>
       <p:sp>
         <p:nvSpPr>
-          <p:cNvPr id="70661" name="Slide Number Placeholder 4"/>
+          <p:cNvPr id="68613" name="Slide Number Placeholder 4"/>
           <p:cNvSpPr>
             <a:spLocks noGrp="1"/>
           </p:cNvSpPr>
@@ -3744,10 +3745,10 @@
           <a:bodyPr/>
           <a:lstStyle/>
           <a:p>
-            <a:fld id="{95A21931-D370-4B48-8877-89EF5A8DF88B}" type="slidenum">
+            <a:fld id="{85CBAAD0-137E-4FAF-82D1-BF2D7E98B31C}" type="slidenum">
               <a:rPr lang="en-US" smtClean="0"/>
               <a:pPr/>
-              <a:t>38</a:t>
+              <a:t>36</a:t>
             </a:fld>
             <a:endParaRPr lang="en-US"/>
           </a:p>
@@ -3756,7 +3757,7 @@
     </p:spTree>
     <p:extLst>
       <p:ext uri="{BB962C8B-B14F-4D97-AF65-F5344CB8AC3E}">
-        <p14:creationId xmlns:p14="http://schemas.microsoft.com/office/powerpoint/2010/main" val="210773126"/>
+        <p14:creationId xmlns:p14="http://schemas.microsoft.com/office/powerpoint/2010/main" val="679541623"/>
       </p:ext>
     </p:extLst>
   </p:cSld>
@@ -3785,7 +3786,7 @@
       </p:grpSpPr>
       <p:sp>
         <p:nvSpPr>
-          <p:cNvPr id="71682" name="Slide Image Placeholder 1"/>
+          <p:cNvPr id="70658" name="Slide Image Placeholder 1"/>
           <p:cNvSpPr>
             <a:spLocks noGrp="1" noRot="1" noChangeAspect="1" noTextEdit="1"/>
           </p:cNvSpPr>
@@ -3799,7 +3800,7 @@
       </p:sp>
       <p:sp>
         <p:nvSpPr>
-          <p:cNvPr id="71683" name="Notes Placeholder 2"/>
+          <p:cNvPr id="70659" name="Notes Placeholder 2"/>
           <p:cNvSpPr>
             <a:spLocks noGrp="1"/>
           </p:cNvSpPr>
@@ -3823,7 +3824,7 @@
       </p:sp>
       <p:sp>
         <p:nvSpPr>
-          <p:cNvPr id="71684" name="Header Placeholder 3"/>
+          <p:cNvPr id="70660" name="Header Placeholder 3"/>
           <p:cNvSpPr>
             <a:spLocks noGrp="1"/>
           </p:cNvSpPr>
@@ -3847,7 +3848,7 @@
       </p:sp>
       <p:sp>
         <p:nvSpPr>
-          <p:cNvPr id="71685" name="Slide Number Placeholder 4"/>
+          <p:cNvPr id="70661" name="Slide Number Placeholder 4"/>
           <p:cNvSpPr>
             <a:spLocks noGrp="1"/>
           </p:cNvSpPr>
@@ -3862,7 +3863,7 @@
           <a:bodyPr/>
           <a:lstStyle/>
           <a:p>
-            <a:fld id="{F098F52E-4DEC-4282-A5F1-1B96068D8C95}" type="slidenum">
+            <a:fld id="{95A21931-D370-4B48-8877-89EF5A8DF88B}" type="slidenum">
               <a:rPr lang="en-US" smtClean="0"/>
               <a:pPr/>
               <a:t>39</a:t>
@@ -3874,7 +3875,7 @@
     </p:spTree>
     <p:extLst>
       <p:ext uri="{BB962C8B-B14F-4D97-AF65-F5344CB8AC3E}">
-        <p14:creationId xmlns:p14="http://schemas.microsoft.com/office/powerpoint/2010/main" val="3378835346"/>
+        <p14:creationId xmlns:p14="http://schemas.microsoft.com/office/powerpoint/2010/main" val="210773126"/>
       </p:ext>
     </p:extLst>
   </p:cSld>
@@ -3903,7 +3904,7 @@
       </p:grpSpPr>
       <p:sp>
         <p:nvSpPr>
-          <p:cNvPr id="63490" name="Slide Image Placeholder 1"/>
+          <p:cNvPr id="71682" name="Slide Image Placeholder 1"/>
           <p:cNvSpPr>
             <a:spLocks noGrp="1" noRot="1" noChangeAspect="1" noTextEdit="1"/>
           </p:cNvSpPr>
@@ -3917,7 +3918,7 @@
       </p:sp>
       <p:sp>
         <p:nvSpPr>
-          <p:cNvPr id="63491" name="Notes Placeholder 2"/>
+          <p:cNvPr id="71683" name="Notes Placeholder 2"/>
           <p:cNvSpPr>
             <a:spLocks noGrp="1"/>
           </p:cNvSpPr>
@@ -3941,7 +3942,7 @@
       </p:sp>
       <p:sp>
         <p:nvSpPr>
-          <p:cNvPr id="63492" name="Header Placeholder 3"/>
+          <p:cNvPr id="71684" name="Header Placeholder 3"/>
           <p:cNvSpPr>
             <a:spLocks noGrp="1"/>
           </p:cNvSpPr>
@@ -3965,7 +3966,7 @@
       </p:sp>
       <p:sp>
         <p:nvSpPr>
-          <p:cNvPr id="63493" name="Slide Number Placeholder 4"/>
+          <p:cNvPr id="71685" name="Slide Number Placeholder 4"/>
           <p:cNvSpPr>
             <a:spLocks noGrp="1"/>
           </p:cNvSpPr>
@@ -3980,10 +3981,128 @@
           <a:bodyPr/>
           <a:lstStyle/>
           <a:p>
+            <a:fld id="{F098F52E-4DEC-4282-A5F1-1B96068D8C95}" type="slidenum">
+              <a:rPr lang="en-US" smtClean="0"/>
+              <a:pPr/>
+              <a:t>40</a:t>
+            </a:fld>
+            <a:endParaRPr lang="en-US"/>
+          </a:p>
+        </p:txBody>
+      </p:sp>
+    </p:spTree>
+    <p:extLst>
+      <p:ext uri="{BB962C8B-B14F-4D97-AF65-F5344CB8AC3E}">
+        <p14:creationId xmlns:p14="http://schemas.microsoft.com/office/powerpoint/2010/main" val="3378835346"/>
+      </p:ext>
+    </p:extLst>
+  </p:cSld>
+  <p:clrMapOvr>
+    <a:masterClrMapping/>
+  </p:clrMapOvr>
+</p:notes>
+</file>
+
+<file path=ppt/notesSlides/notesSlide34.xml><?xml version="1.0" encoding="utf-8"?>
+<p:notes xmlns:a="http://schemas.openxmlformats.org/drawingml/2006/main" xmlns:r="http://schemas.openxmlformats.org/officeDocument/2006/relationships" xmlns:p="http://schemas.openxmlformats.org/presentationml/2006/main">
+  <p:cSld>
+    <p:spTree>
+      <p:nvGrpSpPr>
+        <p:cNvPr id="1" name=""/>
+        <p:cNvGrpSpPr/>
+        <p:nvPr/>
+      </p:nvGrpSpPr>
+      <p:grpSpPr>
+        <a:xfrm>
+          <a:off x="0" y="0"/>
+          <a:ext cx="0" cy="0"/>
+          <a:chOff x="0" y="0"/>
+          <a:chExt cx="0" cy="0"/>
+        </a:xfrm>
+      </p:grpSpPr>
+      <p:sp>
+        <p:nvSpPr>
+          <p:cNvPr id="63490" name="Slide Image Placeholder 1"/>
+          <p:cNvSpPr>
+            <a:spLocks noGrp="1" noRot="1" noChangeAspect="1" noTextEdit="1"/>
+          </p:cNvSpPr>
+          <p:nvPr>
+            <p:ph type="sldImg"/>
+          </p:nvPr>
+        </p:nvSpPr>
+        <p:spPr>
+          <a:ln/>
+        </p:spPr>
+      </p:sp>
+      <p:sp>
+        <p:nvSpPr>
+          <p:cNvPr id="63491" name="Notes Placeholder 2"/>
+          <p:cNvSpPr>
+            <a:spLocks noGrp="1"/>
+          </p:cNvSpPr>
+          <p:nvPr>
+            <p:ph type="body" idx="1"/>
+          </p:nvPr>
+        </p:nvSpPr>
+        <p:spPr>
+          <a:noFill/>
+          <a:ln/>
+        </p:spPr>
+        <p:txBody>
+          <a:bodyPr/>
+          <a:lstStyle/>
+          <a:p>
+            <a:endParaRPr lang="en-US">
+              <a:latin typeface="Times New Roman" pitchFamily="18" charset="0"/>
+            </a:endParaRPr>
+          </a:p>
+        </p:txBody>
+      </p:sp>
+      <p:sp>
+        <p:nvSpPr>
+          <p:cNvPr id="63492" name="Header Placeholder 3"/>
+          <p:cNvSpPr>
+            <a:spLocks noGrp="1"/>
+          </p:cNvSpPr>
+          <p:nvPr>
+            <p:ph type="hdr" sz="quarter"/>
+          </p:nvPr>
+        </p:nvSpPr>
+        <p:spPr>
+          <a:noFill/>
+        </p:spPr>
+        <p:txBody>
+          <a:bodyPr/>
+          <a:lstStyle/>
+          <a:p>
+            <a:r>
+              <a:rPr lang="en-US"/>
+              <a:t>Context-Free Grammars</a:t>
+            </a:r>
+          </a:p>
+        </p:txBody>
+      </p:sp>
+      <p:sp>
+        <p:nvSpPr>
+          <p:cNvPr id="63493" name="Slide Number Placeholder 4"/>
+          <p:cNvSpPr>
+            <a:spLocks noGrp="1"/>
+          </p:cNvSpPr>
+          <p:nvPr>
+            <p:ph type="sldNum" sz="quarter" idx="5"/>
+          </p:nvPr>
+        </p:nvSpPr>
+        <p:spPr>
+          <a:noFill/>
+        </p:spPr>
+        <p:txBody>
+          <a:bodyPr/>
+          <a:lstStyle/>
+          <a:p>
             <a:fld id="{0160FB28-0AC8-4979-9656-2B4568F10EB7}" type="slidenum">
               <a:rPr lang="en-US" smtClean="0"/>
               <a:pPr/>
-              <a:t>40</a:t>
+              <a:t>41</a:t>
             </a:fld>
             <a:endParaRPr lang="en-US"/>
           </a:p>
@@ -14482,6 +14601,337 @@
       </p:grpSpPr>
       <p:sp>
         <p:nvSpPr>
+          <p:cNvPr id="31749" name="Rectangle 2"/>
+          <p:cNvSpPr>
+            <a:spLocks noGrp="1" noChangeArrowheads="1"/>
+          </p:cNvSpPr>
+          <p:nvPr>
+            <p:ph type="title"/>
+          </p:nvPr>
+        </p:nvSpPr>
+        <p:spPr/>
+        <p:txBody>
+          <a:bodyPr/>
+          <a:lstStyle/>
+          <a:p>
+            <a:r>
+              <a:rPr lang="en-US" dirty="0"/>
+              <a:t>Some Grammars Have Problems</a:t>
+            </a:r>
+            <a:endParaRPr lang="en-US" sz="2600" dirty="0"/>
+          </a:p>
+        </p:txBody>
+      </p:sp>
+      <p:sp>
+        <p:nvSpPr>
+          <p:cNvPr id="2" name="Content Placeholder 1">
+            <a:extLst>
+              <a:ext uri="{FF2B5EF4-FFF2-40B4-BE49-F238E27FC236}">
+                <a16:creationId xmlns:a16="http://schemas.microsoft.com/office/drawing/2014/main" id="{7433E997-C4DF-4C01-8DF4-6264AC033168}"/>
+              </a:ext>
+            </a:extLst>
+          </p:cNvPr>
+          <p:cNvSpPr>
+            <a:spLocks noGrp="1"/>
+          </p:cNvSpPr>
+          <p:nvPr>
+            <p:ph idx="1"/>
+          </p:nvPr>
+        </p:nvSpPr>
+        <p:spPr/>
+        <p:txBody>
+          <a:bodyPr/>
+          <a:lstStyle/>
+          <a:p>
+            <a:r>
+              <a:rPr lang="en-US" dirty="0"/>
+              <a:t>Using the same grammar, let’s perform a different left-most derivation of “</a:t>
+            </a:r>
+            <a:r>
+              <a:rPr lang="en-US" dirty="0">
+                <a:latin typeface="Consolas" panose="020B0609020204030204" pitchFamily="49" charset="0"/>
+              </a:rPr>
+              <a:t>2 + 3 * x</a:t>
+            </a:r>
+            <a:r>
+              <a:rPr lang="en-US" dirty="0"/>
+              <a:t>” by choosing a different alternative for </a:t>
+            </a:r>
+            <a:r>
+              <a:rPr lang="en-US" dirty="0">
+                <a:latin typeface="Consolas" panose="020B0609020204030204" pitchFamily="49" charset="0"/>
+              </a:rPr>
+              <a:t>expr</a:t>
+            </a:r>
+            <a:r>
+              <a:rPr lang="en-US" dirty="0"/>
+              <a:t> in the beginning.</a:t>
+            </a:r>
+          </a:p>
+          <a:p>
+            <a:r>
+              <a:rPr lang="en-US" dirty="0"/>
+              <a:t>Left-most derivation:</a:t>
+            </a:r>
+          </a:p>
+          <a:p>
+            <a:pPr marL="457200" lvl="1" indent="0">
+              <a:buNone/>
+            </a:pPr>
+            <a:r>
+              <a:rPr lang="en-US" sz="1800" dirty="0">
+                <a:latin typeface="Consolas" panose="020B0609020204030204" pitchFamily="49" charset="0"/>
+              </a:rPr>
+              <a:t>expr =&gt; </a:t>
+            </a:r>
+            <a:r>
+              <a:rPr lang="en-US" sz="1800" u="sng" dirty="0">
+                <a:latin typeface="Consolas" panose="020B0609020204030204" pitchFamily="49" charset="0"/>
+              </a:rPr>
+              <a:t>expr</a:t>
+            </a:r>
+            <a:r>
+              <a:rPr lang="en-US" sz="1800" dirty="0">
+                <a:latin typeface="Consolas" panose="020B0609020204030204" pitchFamily="49" charset="0"/>
+              </a:rPr>
+              <a:t> op expr</a:t>
+            </a:r>
+          </a:p>
+          <a:p>
+            <a:pPr marL="457200" lvl="1" indent="0">
+              <a:spcBef>
+                <a:spcPts val="100"/>
+              </a:spcBef>
+              <a:buNone/>
+            </a:pPr>
+            <a:r>
+              <a:rPr lang="en-US" sz="1800" dirty="0">
+                <a:latin typeface="Consolas" panose="020B0609020204030204" pitchFamily="49" charset="0"/>
+              </a:rPr>
+              <a:t>     =&gt; expr op expr op expr</a:t>
+            </a:r>
+          </a:p>
+          <a:p>
+            <a:pPr marL="457200" lvl="1" indent="0">
+              <a:spcBef>
+                <a:spcPts val="100"/>
+              </a:spcBef>
+              <a:buNone/>
+            </a:pPr>
+            <a:r>
+              <a:rPr lang="en-US" sz="1800" dirty="0">
+                <a:latin typeface="Consolas" panose="020B0609020204030204" pitchFamily="49" charset="0"/>
+              </a:rPr>
+              <a:t>     =&gt; </a:t>
+            </a:r>
+            <a:r>
+              <a:rPr lang="en-US" sz="1800" dirty="0" err="1">
+                <a:latin typeface="Consolas" panose="020B0609020204030204" pitchFamily="49" charset="0"/>
+              </a:rPr>
+              <a:t>intLit</a:t>
+            </a:r>
+            <a:r>
+              <a:rPr lang="en-US" sz="1800" dirty="0">
+                <a:latin typeface="Consolas" panose="020B0609020204030204" pitchFamily="49" charset="0"/>
+              </a:rPr>
+              <a:t> </a:t>
+            </a:r>
+            <a:r>
+              <a:rPr lang="en-US" sz="1800" u="sng" dirty="0">
+                <a:latin typeface="Consolas" panose="020B0609020204030204" pitchFamily="49" charset="0"/>
+              </a:rPr>
+              <a:t>op</a:t>
+            </a:r>
+            <a:r>
+              <a:rPr lang="en-US" sz="1800" dirty="0">
+                <a:latin typeface="Consolas" panose="020B0609020204030204" pitchFamily="49" charset="0"/>
+              </a:rPr>
+              <a:t> expr op expr</a:t>
+            </a:r>
+          </a:p>
+          <a:p>
+            <a:pPr marL="457200" lvl="1" indent="0">
+              <a:spcBef>
+                <a:spcPts val="100"/>
+              </a:spcBef>
+              <a:buNone/>
+            </a:pPr>
+            <a:r>
+              <a:rPr lang="en-US" sz="1800" dirty="0">
+                <a:latin typeface="Consolas" panose="020B0609020204030204" pitchFamily="49" charset="0"/>
+              </a:rPr>
+              <a:t>     =&gt; </a:t>
+            </a:r>
+            <a:r>
+              <a:rPr lang="en-US" sz="1800" dirty="0" err="1">
+                <a:latin typeface="Consolas" panose="020B0609020204030204" pitchFamily="49" charset="0"/>
+              </a:rPr>
+              <a:t>intLit</a:t>
+            </a:r>
+            <a:r>
+              <a:rPr lang="en-US" sz="1800" dirty="0">
+                <a:latin typeface="Consolas" panose="020B0609020204030204" pitchFamily="49" charset="0"/>
+              </a:rPr>
+              <a:t> + </a:t>
+            </a:r>
+            <a:r>
+              <a:rPr lang="en-US" sz="1800" u="sng" dirty="0">
+                <a:latin typeface="Consolas" panose="020B0609020204030204" pitchFamily="49" charset="0"/>
+              </a:rPr>
+              <a:t>expr</a:t>
+            </a:r>
+            <a:r>
+              <a:rPr lang="en-US" sz="1800" dirty="0">
+                <a:latin typeface="Consolas" panose="020B0609020204030204" pitchFamily="49" charset="0"/>
+              </a:rPr>
+              <a:t> op expr</a:t>
+            </a:r>
+          </a:p>
+          <a:p>
+            <a:pPr marL="457200" lvl="1" indent="0">
+              <a:spcBef>
+                <a:spcPts val="100"/>
+              </a:spcBef>
+              <a:buNone/>
+            </a:pPr>
+            <a:r>
+              <a:rPr lang="en-US" sz="1800" dirty="0">
+                <a:latin typeface="Consolas" panose="020B0609020204030204" pitchFamily="49" charset="0"/>
+              </a:rPr>
+              <a:t>     =&gt; </a:t>
+            </a:r>
+            <a:r>
+              <a:rPr lang="en-US" sz="1800" dirty="0" err="1">
+                <a:latin typeface="Consolas" panose="020B0609020204030204" pitchFamily="49" charset="0"/>
+              </a:rPr>
+              <a:t>intLit</a:t>
+            </a:r>
+            <a:r>
+              <a:rPr lang="en-US" sz="1800" dirty="0">
+                <a:latin typeface="Consolas" panose="020B0609020204030204" pitchFamily="49" charset="0"/>
+              </a:rPr>
+              <a:t> + </a:t>
+            </a:r>
+            <a:r>
+              <a:rPr lang="en-US" sz="1800" dirty="0" err="1">
+                <a:latin typeface="Consolas" panose="020B0609020204030204" pitchFamily="49" charset="0"/>
+              </a:rPr>
+              <a:t>intLit</a:t>
+            </a:r>
+            <a:r>
+              <a:rPr lang="en-US" sz="1800" dirty="0">
+                <a:latin typeface="Consolas" panose="020B0609020204030204" pitchFamily="49" charset="0"/>
+              </a:rPr>
+              <a:t> </a:t>
+            </a:r>
+            <a:r>
+              <a:rPr lang="en-US" sz="1800" u="sng" dirty="0">
+                <a:latin typeface="Consolas" panose="020B0609020204030204" pitchFamily="49" charset="0"/>
+              </a:rPr>
+              <a:t>op</a:t>
+            </a:r>
+            <a:r>
+              <a:rPr lang="en-US" sz="1800" dirty="0">
+                <a:latin typeface="Consolas" panose="020B0609020204030204" pitchFamily="49" charset="0"/>
+              </a:rPr>
+              <a:t> expr</a:t>
+            </a:r>
+          </a:p>
+          <a:p>
+            <a:pPr marL="457200" lvl="1" indent="0">
+              <a:spcBef>
+                <a:spcPts val="100"/>
+              </a:spcBef>
+              <a:buNone/>
+            </a:pPr>
+            <a:r>
+              <a:rPr lang="en-US" sz="1800" dirty="0">
+                <a:latin typeface="Consolas" panose="020B0609020204030204" pitchFamily="49" charset="0"/>
+              </a:rPr>
+              <a:t>     =&gt; </a:t>
+            </a:r>
+            <a:r>
+              <a:rPr lang="en-US" sz="1800" dirty="0" err="1">
+                <a:latin typeface="Consolas" panose="020B0609020204030204" pitchFamily="49" charset="0"/>
+              </a:rPr>
+              <a:t>intLit</a:t>
+            </a:r>
+            <a:r>
+              <a:rPr lang="en-US" sz="1800" dirty="0">
+                <a:latin typeface="Consolas" panose="020B0609020204030204" pitchFamily="49" charset="0"/>
+              </a:rPr>
+              <a:t> + </a:t>
+            </a:r>
+            <a:r>
+              <a:rPr lang="en-US" sz="1800" dirty="0" err="1">
+                <a:latin typeface="Consolas" panose="020B0609020204030204" pitchFamily="49" charset="0"/>
+              </a:rPr>
+              <a:t>intLit</a:t>
+            </a:r>
+            <a:r>
+              <a:rPr lang="en-US" sz="1800" dirty="0">
+                <a:latin typeface="Consolas" panose="020B0609020204030204" pitchFamily="49" charset="0"/>
+              </a:rPr>
+              <a:t> * </a:t>
+            </a:r>
+            <a:r>
+              <a:rPr lang="en-US" sz="1800" u="sng" dirty="0">
+                <a:latin typeface="Consolas" panose="020B0609020204030204" pitchFamily="49" charset="0"/>
+              </a:rPr>
+              <a:t>expr</a:t>
+            </a:r>
+          </a:p>
+          <a:p>
+            <a:pPr marL="457200" lvl="1" indent="0">
+              <a:spcBef>
+                <a:spcPts val="100"/>
+              </a:spcBef>
+              <a:buNone/>
+            </a:pPr>
+            <a:r>
+              <a:rPr lang="en-US" sz="1800" dirty="0">
+                <a:latin typeface="Consolas" panose="020B0609020204030204" pitchFamily="49" charset="0"/>
+              </a:rPr>
+              <a:t>     =&gt; </a:t>
+            </a:r>
+            <a:r>
+              <a:rPr lang="en-US" sz="1800" dirty="0" err="1">
+                <a:latin typeface="Consolas" panose="020B0609020204030204" pitchFamily="49" charset="0"/>
+              </a:rPr>
+              <a:t>intLit</a:t>
+            </a:r>
+            <a:r>
+              <a:rPr lang="en-US" sz="1800" dirty="0">
+                <a:latin typeface="Consolas" panose="020B0609020204030204" pitchFamily="49" charset="0"/>
+              </a:rPr>
+              <a:t> + </a:t>
+            </a:r>
+            <a:r>
+              <a:rPr lang="en-US" sz="1800" dirty="0" err="1">
+                <a:latin typeface="Consolas" panose="020B0609020204030204" pitchFamily="49" charset="0"/>
+              </a:rPr>
+              <a:t>intLit</a:t>
+            </a:r>
+            <a:r>
+              <a:rPr lang="en-US" sz="1800" dirty="0">
+                <a:latin typeface="Consolas" panose="020B0609020204030204" pitchFamily="49" charset="0"/>
+              </a:rPr>
+              <a:t> * id</a:t>
+            </a:r>
+          </a:p>
+          <a:p>
+            <a:pPr marL="457200" lvl="1" indent="0">
+              <a:spcBef>
+                <a:spcPts val="100"/>
+              </a:spcBef>
+              <a:buNone/>
+            </a:pPr>
+            <a:endParaRPr lang="en-US" dirty="0"/>
+          </a:p>
+        </p:txBody>
+      </p:sp>
+      <p:sp>
+        <p:nvSpPr>
           <p:cNvPr id="31746" name="Footer Placeholder 3"/>
           <p:cNvSpPr>
             <a:spLocks noGrp="1"/>
@@ -14534,6 +14984,85 @@
           </a:p>
         </p:txBody>
       </p:sp>
+    </p:spTree>
+  </p:cSld>
+  <p:clrMapOvr>
+    <a:masterClrMapping/>
+  </p:clrMapOvr>
+</p:sld>
+</file>
+
+<file path=ppt/slides/slide34.xml><?xml version="1.0" encoding="utf-8"?>
+<p:sld xmlns:a="http://schemas.openxmlformats.org/drawingml/2006/main" xmlns:r="http://schemas.openxmlformats.org/officeDocument/2006/relationships" xmlns:p="http://schemas.openxmlformats.org/presentationml/2006/main">
+  <p:cSld>
+    <p:spTree>
+      <p:nvGrpSpPr>
+        <p:cNvPr id="1" name=""/>
+        <p:cNvGrpSpPr/>
+        <p:nvPr/>
+      </p:nvGrpSpPr>
+      <p:grpSpPr>
+        <a:xfrm>
+          <a:off x="0" y="0"/>
+          <a:ext cx="0" cy="0"/>
+          <a:chOff x="0" y="0"/>
+          <a:chExt cx="0" cy="0"/>
+        </a:xfrm>
+      </p:grpSpPr>
+      <p:sp>
+        <p:nvSpPr>
+          <p:cNvPr id="31746" name="Footer Placeholder 3"/>
+          <p:cNvSpPr>
+            <a:spLocks noGrp="1"/>
+          </p:cNvSpPr>
+          <p:nvPr>
+            <p:ph type="ftr" sz="quarter" idx="10"/>
+          </p:nvPr>
+        </p:nvSpPr>
+        <p:spPr>
+          <a:noFill/>
+        </p:spPr>
+        <p:txBody>
+          <a:bodyPr/>
+          <a:lstStyle/>
+          <a:p>
+            <a:r>
+              <a:rPr lang="en-US"/>
+              <a:t>©SoftMoore Consulting</a:t>
+            </a:r>
+          </a:p>
+        </p:txBody>
+      </p:sp>
+      <p:sp>
+        <p:nvSpPr>
+          <p:cNvPr id="31747" name="Slide Number Placeholder 4"/>
+          <p:cNvSpPr>
+            <a:spLocks noGrp="1"/>
+          </p:cNvSpPr>
+          <p:nvPr>
+            <p:ph type="sldNum" sz="quarter" idx="11"/>
+          </p:nvPr>
+        </p:nvSpPr>
+        <p:spPr>
+          <a:noFill/>
+        </p:spPr>
+        <p:txBody>
+          <a:bodyPr/>
+          <a:lstStyle/>
+          <a:p>
+            <a:r>
+              <a:rPr lang="en-US"/>
+              <a:t>Slide </a:t>
+            </a:r>
+            <a:fld id="{92311985-5F6C-4F5A-A334-29F48EB82928}" type="slidenum">
+              <a:rPr lang="en-US" smtClean="0"/>
+              <a:pPr/>
+              <a:t>34</a:t>
+            </a:fld>
+            <a:endParaRPr lang="en-US"/>
+          </a:p>
+        </p:txBody>
+      </p:sp>
       <p:sp>
         <p:nvSpPr>
           <p:cNvPr id="31749" name="Rectangle 2"/>
@@ -14553,7 +15082,13 @@
               <a:rPr lang="en-US" dirty="0"/>
               <a:t>Some Grammars Have Problems</a:t>
             </a:r>
-            <a:endParaRPr lang="en-US" sz="2600" dirty="0"/>
+            <a:br>
+              <a:rPr lang="en-US" dirty="0"/>
+            </a:br>
+            <a:r>
+              <a:rPr lang="en-US" sz="2400" dirty="0"/>
+              <a:t>(continued)</a:t>
+            </a:r>
           </a:p>
         </p:txBody>
       </p:sp>
@@ -17339,8 +17874,8 @@
         </p:nvSpPr>
         <p:spPr>
           <a:xfrm>
-            <a:off x="2039897" y="1381578"/>
-            <a:ext cx="5064207" cy="707886"/>
+            <a:off x="2157717" y="1425714"/>
+            <a:ext cx="4828566" cy="707886"/>
           </a:xfrm>
           <a:prstGeom prst="rect">
             <a:avLst/>
@@ -17355,156 +17890,21 @@
           <a:p>
             <a:r>
               <a:rPr lang="en-US" sz="2000" dirty="0"/>
-              <a:t>Consider parse tree for left-most derivation</a:t>
+              <a:t>Consider parse tree for first derivation</a:t>
             </a:r>
           </a:p>
           <a:p>
             <a:r>
               <a:rPr lang="en-US" sz="2000" dirty="0"/>
-              <a:t>versus parse tree for right-most derivation.</a:t>
-            </a:r>
-          </a:p>
-        </p:txBody>
-      </p:sp>
-    </p:spTree>
-  </p:cSld>
-  <p:clrMapOvr>
-    <a:masterClrMapping/>
-  </p:clrMapOvr>
-</p:sld>
-</file>
-
-<file path=ppt/slides/slide34.xml><?xml version="1.0" encoding="utf-8"?>
-<p:sld xmlns:a="http://schemas.openxmlformats.org/drawingml/2006/main" xmlns:r="http://schemas.openxmlformats.org/officeDocument/2006/relationships" xmlns:p="http://schemas.openxmlformats.org/presentationml/2006/main">
-  <p:cSld>
-    <p:spTree>
-      <p:nvGrpSpPr>
-        <p:cNvPr id="1" name=""/>
-        <p:cNvGrpSpPr/>
-        <p:nvPr/>
-      </p:nvGrpSpPr>
-      <p:grpSpPr>
-        <a:xfrm>
-          <a:off x="0" y="0"/>
-          <a:ext cx="0" cy="0"/>
-          <a:chOff x="0" y="0"/>
-          <a:chExt cx="0" cy="0"/>
-        </a:xfrm>
-      </p:grpSpPr>
-      <p:sp>
-        <p:nvSpPr>
-          <p:cNvPr id="31746" name="Footer Placeholder 3"/>
-          <p:cNvSpPr>
-            <a:spLocks noGrp="1"/>
-          </p:cNvSpPr>
-          <p:nvPr>
-            <p:ph type="ftr" sz="quarter" idx="10"/>
-          </p:nvPr>
-        </p:nvSpPr>
-        <p:spPr>
-          <a:noFill/>
-        </p:spPr>
-        <p:txBody>
-          <a:bodyPr/>
-          <a:lstStyle/>
-          <a:p>
-            <a:r>
-              <a:rPr lang="en-US"/>
-              <a:t>©SoftMoore Consulting</a:t>
-            </a:r>
-          </a:p>
-        </p:txBody>
-      </p:sp>
-      <p:sp>
-        <p:nvSpPr>
-          <p:cNvPr id="31747" name="Slide Number Placeholder 4"/>
-          <p:cNvSpPr>
-            <a:spLocks noGrp="1"/>
-          </p:cNvSpPr>
-          <p:nvPr>
-            <p:ph type="sldNum" sz="quarter" idx="11"/>
-          </p:nvPr>
-        </p:nvSpPr>
-        <p:spPr>
-          <a:noFill/>
-        </p:spPr>
-        <p:txBody>
-          <a:bodyPr/>
-          <a:lstStyle/>
-          <a:p>
-            <a:r>
-              <a:rPr lang="en-US"/>
-              <a:t>Slide </a:t>
-            </a:r>
-            <a:fld id="{92311985-5F6C-4F5A-A334-29F48EB82928}" type="slidenum">
-              <a:rPr lang="en-US" smtClean="0"/>
-              <a:pPr/>
-              <a:t>34</a:t>
-            </a:fld>
-            <a:endParaRPr lang="en-US"/>
-          </a:p>
-        </p:txBody>
-      </p:sp>
-      <p:sp>
-        <p:nvSpPr>
-          <p:cNvPr id="31748" name="Rectangle 3"/>
-          <p:cNvSpPr>
-            <a:spLocks noGrp="1" noChangeArrowheads="1"/>
-          </p:cNvSpPr>
-          <p:nvPr>
-            <p:ph type="body" idx="1"/>
-          </p:nvPr>
-        </p:nvSpPr>
-        <p:spPr/>
-        <p:txBody>
-          <a:bodyPr/>
-          <a:lstStyle/>
-          <a:p>
-            <a:r>
-              <a:rPr lang="en-US" b="1" i="1" dirty="0"/>
-              <a:t>Ambiguous grammar</a:t>
-            </a:r>
-            <a:r>
-              <a:rPr lang="en-US" dirty="0"/>
-              <a:t> – some legal phrase has more than one parse tree.</a:t>
-            </a:r>
-          </a:p>
-        </p:txBody>
-      </p:sp>
-      <p:sp>
-        <p:nvSpPr>
-          <p:cNvPr id="31749" name="Rectangle 2"/>
-          <p:cNvSpPr>
-            <a:spLocks noGrp="1" noChangeArrowheads="1"/>
-          </p:cNvSpPr>
-          <p:nvPr>
-            <p:ph type="title"/>
-          </p:nvPr>
-        </p:nvSpPr>
-        <p:spPr/>
-        <p:txBody>
-          <a:bodyPr/>
-          <a:lstStyle/>
-          <a:p>
-            <a:r>
-              <a:rPr lang="en-US" dirty="0"/>
-              <a:t>Some Grammars Have Problems</a:t>
-            </a:r>
-            <a:br>
-              <a:rPr lang="en-US" dirty="0"/>
-            </a:br>
-            <a:r>
-              <a:rPr lang="en-US" sz="2400" dirty="0"/>
-              <a:t>(continued)</a:t>
-            </a:r>
-            <a:endParaRPr lang="en-US" sz="2600" dirty="0"/>
+              <a:t>versus parse tree for second derivation.</a:t>
+            </a:r>
           </a:p>
         </p:txBody>
       </p:sp>
     </p:spTree>
     <p:extLst>
       <p:ext uri="{BB962C8B-B14F-4D97-AF65-F5344CB8AC3E}">
-        <p14:creationId xmlns:p14="http://schemas.microsoft.com/office/powerpoint/2010/main" val="2547240705"/>
+        <p14:creationId xmlns:p14="http://schemas.microsoft.com/office/powerpoint/2010/main" val="860789974"/>
       </p:ext>
     </p:extLst>
   </p:cSld>
@@ -17533,7 +17933,7 @@
       </p:grpSpPr>
       <p:sp>
         <p:nvSpPr>
-          <p:cNvPr id="32770" name="Footer Placeholder 3"/>
+          <p:cNvPr id="31746" name="Footer Placeholder 3"/>
           <p:cNvSpPr>
             <a:spLocks noGrp="1"/>
           </p:cNvSpPr>
@@ -17557,7 +17957,7 @@
       </p:sp>
       <p:sp>
         <p:nvSpPr>
-          <p:cNvPr id="32771" name="Slide Number Placeholder 4"/>
+          <p:cNvPr id="31747" name="Slide Number Placeholder 4"/>
           <p:cNvSpPr>
             <a:spLocks noGrp="1"/>
           </p:cNvSpPr>
@@ -17576,7 +17976,7 @@
               <a:rPr lang="en-US"/>
               <a:t>Slide </a:t>
             </a:r>
-            <a:fld id="{9BDDD571-F000-4E22-91B6-8AE9D6141280}" type="slidenum">
+            <a:fld id="{92311985-5F6C-4F5A-A334-29F48EB82928}" type="slidenum">
               <a:rPr lang="en-US" smtClean="0"/>
               <a:pPr/>
               <a:t>35</a:t>
@@ -17587,11 +17987,37 @@
       </p:sp>
       <p:sp>
         <p:nvSpPr>
-          <p:cNvPr id="32772" name="Rectangle 2"/>
+          <p:cNvPr id="31748" name="Rectangle 3"/>
           <p:cNvSpPr>
             <a:spLocks noGrp="1" noChangeArrowheads="1"/>
           </p:cNvSpPr>
           <p:nvPr>
+            <p:ph type="body" idx="1"/>
+          </p:nvPr>
+        </p:nvSpPr>
+        <p:spPr/>
+        <p:txBody>
+          <a:bodyPr/>
+          <a:lstStyle/>
+          <a:p>
+            <a:r>
+              <a:rPr lang="en-US" b="1" i="1" dirty="0"/>
+              <a:t>Ambiguous grammar</a:t>
+            </a:r>
+            <a:r>
+              <a:rPr lang="en-US" dirty="0"/>
+              <a:t> – some legal phrase has more than one parse tree.</a:t>
+            </a:r>
+          </a:p>
+        </p:txBody>
+      </p:sp>
+      <p:sp>
+        <p:nvSpPr>
+          <p:cNvPr id="31749" name="Rectangle 2"/>
+          <p:cNvSpPr>
+            <a:spLocks noGrp="1" noChangeArrowheads="1"/>
+          </p:cNvSpPr>
+          <p:nvPr>
             <p:ph type="title"/>
           </p:nvPr>
         </p:nvSpPr>
@@ -17601,82 +18027,26 @@
           <a:lstStyle/>
           <a:p>
             <a:r>
-              <a:rPr lang="en-US"/>
-              <a:t>Specifying Operator Precedence</a:t>
-            </a:r>
-          </a:p>
-        </p:txBody>
-      </p:sp>
-      <p:sp>
-        <p:nvSpPr>
-          <p:cNvPr id="32773" name="Rectangle 3"/>
-          <p:cNvSpPr>
-            <a:spLocks noGrp="1" noChangeArrowheads="1"/>
-          </p:cNvSpPr>
-          <p:nvPr>
-            <p:ph type="body" idx="1"/>
-          </p:nvPr>
-        </p:nvSpPr>
-        <p:spPr/>
-        <p:txBody>
-          <a:bodyPr/>
-          <a:lstStyle/>
-          <a:p>
-            <a:pPr marL="457200" indent="-457200"/>
-            <a:r>
-              <a:rPr lang="en-US" dirty="0"/>
-              <a:t>Operator precedence refers to the relative priority of operators</a:t>
-            </a:r>
-          </a:p>
-          <a:p>
-            <a:pPr marL="457200" indent="-457200"/>
-            <a:r>
-              <a:rPr lang="en-US" dirty="0"/>
-              <a:t>Two approaches to specifying operator precedence</a:t>
-            </a:r>
-          </a:p>
-          <a:p>
-            <a:pPr marL="838200" lvl="1" indent="-381000">
-              <a:buFontTx/>
-              <a:buAutoNum type="arabicPeriod"/>
-            </a:pPr>
-            <a:r>
-              <a:rPr lang="en-US" dirty="0"/>
-              <a:t>Within the grammar</a:t>
-            </a:r>
-          </a:p>
-          <a:p>
-            <a:pPr marL="838200" lvl="1" indent="-381000">
-              <a:buFontTx/>
-              <a:buAutoNum type="arabicPeriod"/>
-            </a:pPr>
-            <a:r>
-              <a:rPr lang="en-US" dirty="0"/>
-              <a:t>Use an additional specification mechanism (e.g., a table) separate from grammar</a:t>
-            </a:r>
-          </a:p>
-          <a:p>
-            <a:pPr marL="457200" indent="-457200"/>
-            <a:r>
-              <a:rPr lang="en-US" dirty="0"/>
-              <a:t>We will use the first approach in our definition for CPRL, but the second approach is supported by some compiler tools (e.g., </a:t>
-            </a:r>
-            <a:r>
-              <a:rPr lang="en-US" dirty="0" err="1"/>
-              <a:t>yacc</a:t>
-            </a:r>
-            <a:r>
-              <a:rPr lang="en-US" dirty="0"/>
-              <a:t>)</a:t>
-            </a:r>
-          </a:p>
-          <a:p>
-            <a:pPr marL="457200" indent="-457200"/>
-            <a:endParaRPr lang="en-US" dirty="0"/>
+              <a:rPr lang="en-US" dirty="0"/>
+              <a:t>Some Grammars Have Problems</a:t>
+            </a:r>
+            <a:br>
+              <a:rPr lang="en-US" dirty="0"/>
+            </a:br>
+            <a:r>
+              <a:rPr lang="en-US" sz="2400" dirty="0"/>
+              <a:t>(continued)</a:t>
+            </a:r>
+            <a:endParaRPr lang="en-US" sz="2600" dirty="0"/>
           </a:p>
         </p:txBody>
       </p:sp>
     </p:spTree>
+    <p:extLst>
+      <p:ext uri="{BB962C8B-B14F-4D97-AF65-F5344CB8AC3E}">
+        <p14:creationId xmlns:p14="http://schemas.microsoft.com/office/powerpoint/2010/main" val="2547240705"/>
+      </p:ext>
+    </p:extLst>
   </p:cSld>
   <p:clrMapOvr>
     <a:masterClrMapping/>
@@ -17703,6 +18073,176 @@
       </p:grpSpPr>
       <p:sp>
         <p:nvSpPr>
+          <p:cNvPr id="32770" name="Footer Placeholder 3"/>
+          <p:cNvSpPr>
+            <a:spLocks noGrp="1"/>
+          </p:cNvSpPr>
+          <p:nvPr>
+            <p:ph type="ftr" sz="quarter" idx="10"/>
+          </p:nvPr>
+        </p:nvSpPr>
+        <p:spPr>
+          <a:noFill/>
+        </p:spPr>
+        <p:txBody>
+          <a:bodyPr/>
+          <a:lstStyle/>
+          <a:p>
+            <a:r>
+              <a:rPr lang="en-US"/>
+              <a:t>©SoftMoore Consulting</a:t>
+            </a:r>
+          </a:p>
+        </p:txBody>
+      </p:sp>
+      <p:sp>
+        <p:nvSpPr>
+          <p:cNvPr id="32771" name="Slide Number Placeholder 4"/>
+          <p:cNvSpPr>
+            <a:spLocks noGrp="1"/>
+          </p:cNvSpPr>
+          <p:nvPr>
+            <p:ph type="sldNum" sz="quarter" idx="11"/>
+          </p:nvPr>
+        </p:nvSpPr>
+        <p:spPr>
+          <a:noFill/>
+        </p:spPr>
+        <p:txBody>
+          <a:bodyPr/>
+          <a:lstStyle/>
+          <a:p>
+            <a:r>
+              <a:rPr lang="en-US"/>
+              <a:t>Slide </a:t>
+            </a:r>
+            <a:fld id="{9BDDD571-F000-4E22-91B6-8AE9D6141280}" type="slidenum">
+              <a:rPr lang="en-US" smtClean="0"/>
+              <a:pPr/>
+              <a:t>36</a:t>
+            </a:fld>
+            <a:endParaRPr lang="en-US"/>
+          </a:p>
+        </p:txBody>
+      </p:sp>
+      <p:sp>
+        <p:nvSpPr>
+          <p:cNvPr id="32772" name="Rectangle 2"/>
+          <p:cNvSpPr>
+            <a:spLocks noGrp="1" noChangeArrowheads="1"/>
+          </p:cNvSpPr>
+          <p:nvPr>
+            <p:ph type="title"/>
+          </p:nvPr>
+        </p:nvSpPr>
+        <p:spPr/>
+        <p:txBody>
+          <a:bodyPr/>
+          <a:lstStyle/>
+          <a:p>
+            <a:r>
+              <a:rPr lang="en-US"/>
+              <a:t>Specifying Operator Precedence</a:t>
+            </a:r>
+          </a:p>
+        </p:txBody>
+      </p:sp>
+      <p:sp>
+        <p:nvSpPr>
+          <p:cNvPr id="32773" name="Rectangle 3"/>
+          <p:cNvSpPr>
+            <a:spLocks noGrp="1" noChangeArrowheads="1"/>
+          </p:cNvSpPr>
+          <p:nvPr>
+            <p:ph type="body" idx="1"/>
+          </p:nvPr>
+        </p:nvSpPr>
+        <p:spPr/>
+        <p:txBody>
+          <a:bodyPr/>
+          <a:lstStyle/>
+          <a:p>
+            <a:pPr marL="457200" indent="-457200"/>
+            <a:r>
+              <a:rPr lang="en-US" dirty="0"/>
+              <a:t>Operator precedence refers to the relative priority of operators</a:t>
+            </a:r>
+          </a:p>
+          <a:p>
+            <a:pPr marL="457200" indent="-457200"/>
+            <a:r>
+              <a:rPr lang="en-US" dirty="0"/>
+              <a:t>Two approaches to specifying operator precedence</a:t>
+            </a:r>
+          </a:p>
+          <a:p>
+            <a:pPr marL="838200" lvl="1" indent="-381000">
+              <a:buFontTx/>
+              <a:buAutoNum type="arabicPeriod"/>
+            </a:pPr>
+            <a:r>
+              <a:rPr lang="en-US" dirty="0"/>
+              <a:t>Within the grammar</a:t>
+            </a:r>
+          </a:p>
+          <a:p>
+            <a:pPr marL="838200" lvl="1" indent="-381000">
+              <a:buFontTx/>
+              <a:buAutoNum type="arabicPeriod"/>
+            </a:pPr>
+            <a:r>
+              <a:rPr lang="en-US" dirty="0"/>
+              <a:t>Use an additional specification mechanism (e.g., a table) separate from grammar</a:t>
+            </a:r>
+          </a:p>
+          <a:p>
+            <a:pPr marL="457200" indent="-457200"/>
+            <a:r>
+              <a:rPr lang="en-US" dirty="0"/>
+              <a:t>We will use the first approach in our definition for CPRL, but the second approach is supported by some compiler tools (e.g., </a:t>
+            </a:r>
+            <a:r>
+              <a:rPr lang="en-US" dirty="0" err="1"/>
+              <a:t>yacc</a:t>
+            </a:r>
+            <a:r>
+              <a:rPr lang="en-US" dirty="0"/>
+              <a:t>)</a:t>
+            </a:r>
+          </a:p>
+          <a:p>
+            <a:pPr marL="457200" indent="-457200"/>
+            <a:endParaRPr lang="en-US" dirty="0"/>
+          </a:p>
+        </p:txBody>
+      </p:sp>
+    </p:spTree>
+  </p:cSld>
+  <p:clrMapOvr>
+    <a:masterClrMapping/>
+  </p:clrMapOvr>
+</p:sld>
+</file>
+
+<file path=ppt/slides/slide37.xml><?xml version="1.0" encoding="utf-8"?>
+<p:sld xmlns:a="http://schemas.openxmlformats.org/drawingml/2006/main" xmlns:r="http://schemas.openxmlformats.org/officeDocument/2006/relationships" xmlns:p="http://schemas.openxmlformats.org/presentationml/2006/main">
+  <p:cSld>
+    <p:spTree>
+      <p:nvGrpSpPr>
+        <p:cNvPr id="1" name=""/>
+        <p:cNvGrpSpPr/>
+        <p:nvPr/>
+      </p:nvGrpSpPr>
+      <p:grpSpPr>
+        <a:xfrm>
+          <a:off x="0" y="0"/>
+          <a:ext cx="0" cy="0"/>
+          <a:chOff x="0" y="0"/>
+          <a:chExt cx="0" cy="0"/>
+        </a:xfrm>
+      </p:grpSpPr>
+      <p:sp>
+        <p:nvSpPr>
           <p:cNvPr id="2" name="Title 1">
             <a:extLst>
               <a:ext uri="{FF2B5EF4-FFF2-40B4-BE49-F238E27FC236}">
@@ -17873,7 +18413,7 @@
               <a:pPr>
                 <a:defRPr/>
               </a:pPr>
-              <a:t>36</a:t>
+              <a:t>37</a:t>
             </a:fld>
             <a:endParaRPr lang="en-US"/>
           </a:p>
@@ -19099,246 +19639,6 @@
 </p:sld>
 </file>
 
-<file path=ppt/slides/slide37.xml><?xml version="1.0" encoding="utf-8"?>
-<p:sld xmlns:a="http://schemas.openxmlformats.org/drawingml/2006/main" xmlns:r="http://schemas.openxmlformats.org/officeDocument/2006/relationships" xmlns:p="http://schemas.openxmlformats.org/presentationml/2006/main">
-  <p:cSld>
-    <p:spTree>
-      <p:nvGrpSpPr>
-        <p:cNvPr id="1" name=""/>
-        <p:cNvGrpSpPr/>
-        <p:nvPr/>
-      </p:nvGrpSpPr>
-      <p:grpSpPr>
-        <a:xfrm>
-          <a:off x="0" y="0"/>
-          <a:ext cx="0" cy="0"/>
-          <a:chOff x="0" y="0"/>
-          <a:chExt cx="0" cy="0"/>
-        </a:xfrm>
-      </p:grpSpPr>
-      <p:sp>
-        <p:nvSpPr>
-          <p:cNvPr id="2" name="Title 1">
-            <a:extLst>
-              <a:ext uri="{FF2B5EF4-FFF2-40B4-BE49-F238E27FC236}">
-                <a16:creationId xmlns:a16="http://schemas.microsoft.com/office/drawing/2014/main" id="{12A2EB53-264C-4620-B88B-A362AAF12479}"/>
-              </a:ext>
-            </a:extLst>
-          </p:cNvPr>
-          <p:cNvSpPr>
-            <a:spLocks noGrp="1"/>
-          </p:cNvSpPr>
-          <p:nvPr>
-            <p:ph type="title"/>
-          </p:nvPr>
-        </p:nvSpPr>
-        <p:spPr/>
-        <p:txBody>
-          <a:bodyPr/>
-          <a:lstStyle/>
-          <a:p>
-            <a:r>
-              <a:rPr lang="en-US" dirty="0"/>
-              <a:t>Associativity</a:t>
-            </a:r>
-          </a:p>
-        </p:txBody>
-      </p:sp>
-      <p:sp>
-        <p:nvSpPr>
-          <p:cNvPr id="3" name="Content Placeholder 2">
-            <a:extLst>
-              <a:ext uri="{FF2B5EF4-FFF2-40B4-BE49-F238E27FC236}">
-                <a16:creationId xmlns:a16="http://schemas.microsoft.com/office/drawing/2014/main" id="{D7393F29-C948-48E1-A299-164B53B28203}"/>
-              </a:ext>
-            </a:extLst>
-          </p:cNvPr>
-          <p:cNvSpPr>
-            <a:spLocks noGrp="1"/>
-          </p:cNvSpPr>
-          <p:nvPr>
-            <p:ph idx="1"/>
-          </p:nvPr>
-        </p:nvSpPr>
-        <p:spPr/>
-        <p:txBody>
-          <a:bodyPr/>
-          <a:lstStyle/>
-          <a:p>
-            <a:r>
-              <a:rPr lang="en-US" dirty="0"/>
-              <a:t>Specifies the evaluation order of operators with the same precedence when there are no parentheses.</a:t>
-            </a:r>
-          </a:p>
-          <a:p>
-            <a:r>
-              <a:rPr lang="en-US" dirty="0"/>
-              <a:t>Example 1: CPRL operators </a:t>
-            </a:r>
-            <a:r>
-              <a:rPr lang="en-US" dirty="0">
-                <a:latin typeface="Consolas" panose="020B0609020204030204" pitchFamily="49" charset="0"/>
-              </a:rPr>
-              <a:t>+</a:t>
-            </a:r>
-            <a:r>
-              <a:rPr lang="en-US" dirty="0"/>
-              <a:t> and </a:t>
-            </a:r>
-            <a:r>
-              <a:rPr lang="en-US" dirty="0">
-                <a:latin typeface="Consolas" panose="020B0609020204030204" pitchFamily="49" charset="0"/>
-              </a:rPr>
-              <a:t>-</a:t>
-            </a:r>
-            <a:r>
-              <a:rPr lang="en-US" dirty="0"/>
-              <a:t> are at the same precedence level and are left associative.</a:t>
-            </a:r>
-          </a:p>
-          <a:p>
-            <a:pPr marL="457200" lvl="1" indent="0">
-              <a:buNone/>
-            </a:pPr>
-            <a:r>
-              <a:rPr lang="en-US" dirty="0">
-                <a:latin typeface="Consolas" panose="020B0609020204030204" pitchFamily="49" charset="0"/>
-              </a:rPr>
-              <a:t>8 – 3 + 2</a:t>
-            </a:r>
-            <a:r>
-              <a:rPr lang="en-US" dirty="0"/>
-              <a:t> is evaluated as </a:t>
-            </a:r>
-            <a:r>
-              <a:rPr lang="en-US" dirty="0">
-                <a:latin typeface="Consolas" panose="020B0609020204030204" pitchFamily="49" charset="0"/>
-              </a:rPr>
-              <a:t>(8 – 3) + 2</a:t>
-            </a:r>
-          </a:p>
-          <a:p>
-            <a:r>
-              <a:rPr lang="en-US" dirty="0"/>
-              <a:t>Example 2: Some languages (not CPRL) use </a:t>
-            </a:r>
-            <a:r>
-              <a:rPr lang="en-US" dirty="0">
-                <a:latin typeface="Consolas" panose="020B0609020204030204" pitchFamily="49" charset="0"/>
-              </a:rPr>
-              <a:t>^</a:t>
-            </a:r>
-            <a:r>
-              <a:rPr lang="en-US" dirty="0"/>
-              <a:t> as an exponentiation operator, and exponentiation is usually defined to be right associative.</a:t>
-            </a:r>
-          </a:p>
-          <a:p>
-            <a:pPr marL="457200" lvl="1" indent="0">
-              <a:buNone/>
-            </a:pPr>
-            <a:r>
-              <a:rPr lang="en-US" dirty="0">
-                <a:latin typeface="Consolas" panose="020B0609020204030204" pitchFamily="49" charset="0"/>
-              </a:rPr>
-              <a:t>2^2^3</a:t>
-            </a:r>
-            <a:r>
-              <a:rPr lang="en-US" dirty="0"/>
-              <a:t> is evaluated as </a:t>
-            </a:r>
-            <a:r>
-              <a:rPr lang="en-US" dirty="0">
-                <a:latin typeface="Consolas" panose="020B0609020204030204" pitchFamily="49" charset="0"/>
-              </a:rPr>
-              <a:t>2^(2^3)</a:t>
-            </a:r>
-          </a:p>
-        </p:txBody>
-      </p:sp>
-      <p:sp>
-        <p:nvSpPr>
-          <p:cNvPr id="4" name="Footer Placeholder 3">
-            <a:extLst>
-              <a:ext uri="{FF2B5EF4-FFF2-40B4-BE49-F238E27FC236}">
-                <a16:creationId xmlns:a16="http://schemas.microsoft.com/office/drawing/2014/main" id="{3CB86D02-F08D-4919-9159-9EC3341B9ACB}"/>
-              </a:ext>
-            </a:extLst>
-          </p:cNvPr>
-          <p:cNvSpPr>
-            <a:spLocks noGrp="1"/>
-          </p:cNvSpPr>
-          <p:nvPr>
-            <p:ph type="ftr" sz="quarter" idx="10"/>
-          </p:nvPr>
-        </p:nvSpPr>
-        <p:spPr/>
-        <p:txBody>
-          <a:bodyPr/>
-          <a:lstStyle/>
-          <a:p>
-            <a:pPr>
-              <a:defRPr/>
-            </a:pPr>
-            <a:r>
-              <a:rPr lang="en-US"/>
-              <a:t>©SoftMoore Consulting</a:t>
-            </a:r>
-          </a:p>
-        </p:txBody>
-      </p:sp>
-      <p:sp>
-        <p:nvSpPr>
-          <p:cNvPr id="5" name="Slide Number Placeholder 4">
-            <a:extLst>
-              <a:ext uri="{FF2B5EF4-FFF2-40B4-BE49-F238E27FC236}">
-                <a16:creationId xmlns:a16="http://schemas.microsoft.com/office/drawing/2014/main" id="{A8847019-DCEF-425F-9CEF-FCFA3A5F60AC}"/>
-              </a:ext>
-            </a:extLst>
-          </p:cNvPr>
-          <p:cNvSpPr>
-            <a:spLocks noGrp="1"/>
-          </p:cNvSpPr>
-          <p:nvPr>
-            <p:ph type="sldNum" sz="quarter" idx="11"/>
-          </p:nvPr>
-        </p:nvSpPr>
-        <p:spPr/>
-        <p:txBody>
-          <a:bodyPr/>
-          <a:lstStyle/>
-          <a:p>
-            <a:pPr>
-              <a:defRPr/>
-            </a:pPr>
-            <a:r>
-              <a:rPr lang="en-US"/>
-              <a:t>Slide </a:t>
-            </a:r>
-            <a:fld id="{4EE36E9E-7C32-43CB-8360-5112C6980E92}" type="slidenum">
-              <a:rPr lang="en-US" smtClean="0"/>
-              <a:pPr>
-                <a:defRPr/>
-              </a:pPr>
-              <a:t>37</a:t>
-            </a:fld>
-            <a:endParaRPr lang="en-US"/>
-          </a:p>
-        </p:txBody>
-      </p:sp>
-    </p:spTree>
-    <p:extLst>
-      <p:ext uri="{BB962C8B-B14F-4D97-AF65-F5344CB8AC3E}">
-        <p14:creationId xmlns:p14="http://schemas.microsoft.com/office/powerpoint/2010/main" val="534995203"/>
-      </p:ext>
-    </p:extLst>
-  </p:cSld>
-  <p:clrMapOvr>
-    <a:masterClrMapping/>
-  </p:clrMapOvr>
-</p:sld>
-</file>
-
 <file path=ppt/slides/slide38.xml><?xml version="1.0" encoding="utf-8"?>
 <p:sld xmlns:a="http://schemas.openxmlformats.org/drawingml/2006/main" xmlns:r="http://schemas.openxmlformats.org/officeDocument/2006/relationships" xmlns:p="http://schemas.openxmlformats.org/presentationml/2006/main">
   <p:cSld>
@@ -19358,6 +19658,246 @@
       </p:grpSpPr>
       <p:sp>
         <p:nvSpPr>
+          <p:cNvPr id="2" name="Title 1">
+            <a:extLst>
+              <a:ext uri="{FF2B5EF4-FFF2-40B4-BE49-F238E27FC236}">
+                <a16:creationId xmlns:a16="http://schemas.microsoft.com/office/drawing/2014/main" id="{12A2EB53-264C-4620-B88B-A362AAF12479}"/>
+              </a:ext>
+            </a:extLst>
+          </p:cNvPr>
+          <p:cNvSpPr>
+            <a:spLocks noGrp="1"/>
+          </p:cNvSpPr>
+          <p:nvPr>
+            <p:ph type="title"/>
+          </p:nvPr>
+        </p:nvSpPr>
+        <p:spPr/>
+        <p:txBody>
+          <a:bodyPr/>
+          <a:lstStyle/>
+          <a:p>
+            <a:r>
+              <a:rPr lang="en-US" dirty="0"/>
+              <a:t>Associativity</a:t>
+            </a:r>
+          </a:p>
+        </p:txBody>
+      </p:sp>
+      <p:sp>
+        <p:nvSpPr>
+          <p:cNvPr id="3" name="Content Placeholder 2">
+            <a:extLst>
+              <a:ext uri="{FF2B5EF4-FFF2-40B4-BE49-F238E27FC236}">
+                <a16:creationId xmlns:a16="http://schemas.microsoft.com/office/drawing/2014/main" id="{D7393F29-C948-48E1-A299-164B53B28203}"/>
+              </a:ext>
+            </a:extLst>
+          </p:cNvPr>
+          <p:cNvSpPr>
+            <a:spLocks noGrp="1"/>
+          </p:cNvSpPr>
+          <p:nvPr>
+            <p:ph idx="1"/>
+          </p:nvPr>
+        </p:nvSpPr>
+        <p:spPr/>
+        <p:txBody>
+          <a:bodyPr/>
+          <a:lstStyle/>
+          <a:p>
+            <a:r>
+              <a:rPr lang="en-US" dirty="0"/>
+              <a:t>Specifies the evaluation order of operators with the same precedence when there are no parentheses.</a:t>
+            </a:r>
+          </a:p>
+          <a:p>
+            <a:r>
+              <a:rPr lang="en-US" dirty="0"/>
+              <a:t>Example 1: CPRL operators </a:t>
+            </a:r>
+            <a:r>
+              <a:rPr lang="en-US" dirty="0">
+                <a:latin typeface="Consolas" panose="020B0609020204030204" pitchFamily="49" charset="0"/>
+              </a:rPr>
+              <a:t>+</a:t>
+            </a:r>
+            <a:r>
+              <a:rPr lang="en-US" dirty="0"/>
+              <a:t> and </a:t>
+            </a:r>
+            <a:r>
+              <a:rPr lang="en-US" dirty="0">
+                <a:latin typeface="Consolas" panose="020B0609020204030204" pitchFamily="49" charset="0"/>
+              </a:rPr>
+              <a:t>-</a:t>
+            </a:r>
+            <a:r>
+              <a:rPr lang="en-US" dirty="0"/>
+              <a:t> are at the same precedence level and are left associative.</a:t>
+            </a:r>
+          </a:p>
+          <a:p>
+            <a:pPr marL="457200" lvl="1" indent="0">
+              <a:buNone/>
+            </a:pPr>
+            <a:r>
+              <a:rPr lang="en-US" dirty="0">
+                <a:latin typeface="Consolas" panose="020B0609020204030204" pitchFamily="49" charset="0"/>
+              </a:rPr>
+              <a:t>8 – 3 + 2</a:t>
+            </a:r>
+            <a:r>
+              <a:rPr lang="en-US" dirty="0"/>
+              <a:t> is evaluated as </a:t>
+            </a:r>
+            <a:r>
+              <a:rPr lang="en-US" dirty="0">
+                <a:latin typeface="Consolas" panose="020B0609020204030204" pitchFamily="49" charset="0"/>
+              </a:rPr>
+              <a:t>(8 – 3) + 2</a:t>
+            </a:r>
+          </a:p>
+          <a:p>
+            <a:r>
+              <a:rPr lang="en-US" dirty="0"/>
+              <a:t>Example 2: Some languages (not CPRL) use </a:t>
+            </a:r>
+            <a:r>
+              <a:rPr lang="en-US" dirty="0">
+                <a:latin typeface="Consolas" panose="020B0609020204030204" pitchFamily="49" charset="0"/>
+              </a:rPr>
+              <a:t>^</a:t>
+            </a:r>
+            <a:r>
+              <a:rPr lang="en-US" dirty="0"/>
+              <a:t> as an exponentiation operator, and exponentiation is usually defined to be right associative.</a:t>
+            </a:r>
+          </a:p>
+          <a:p>
+            <a:pPr marL="457200" lvl="1" indent="0">
+              <a:buNone/>
+            </a:pPr>
+            <a:r>
+              <a:rPr lang="en-US" dirty="0">
+                <a:latin typeface="Consolas" panose="020B0609020204030204" pitchFamily="49" charset="0"/>
+              </a:rPr>
+              <a:t>2^2^3</a:t>
+            </a:r>
+            <a:r>
+              <a:rPr lang="en-US" dirty="0"/>
+              <a:t> is evaluated as </a:t>
+            </a:r>
+            <a:r>
+              <a:rPr lang="en-US" dirty="0">
+                <a:latin typeface="Consolas" panose="020B0609020204030204" pitchFamily="49" charset="0"/>
+              </a:rPr>
+              <a:t>2^(2^3)</a:t>
+            </a:r>
+          </a:p>
+        </p:txBody>
+      </p:sp>
+      <p:sp>
+        <p:nvSpPr>
+          <p:cNvPr id="4" name="Footer Placeholder 3">
+            <a:extLst>
+              <a:ext uri="{FF2B5EF4-FFF2-40B4-BE49-F238E27FC236}">
+                <a16:creationId xmlns:a16="http://schemas.microsoft.com/office/drawing/2014/main" id="{3CB86D02-F08D-4919-9159-9EC3341B9ACB}"/>
+              </a:ext>
+            </a:extLst>
+          </p:cNvPr>
+          <p:cNvSpPr>
+            <a:spLocks noGrp="1"/>
+          </p:cNvSpPr>
+          <p:nvPr>
+            <p:ph type="ftr" sz="quarter" idx="10"/>
+          </p:nvPr>
+        </p:nvSpPr>
+        <p:spPr/>
+        <p:txBody>
+          <a:bodyPr/>
+          <a:lstStyle/>
+          <a:p>
+            <a:pPr>
+              <a:defRPr/>
+            </a:pPr>
+            <a:r>
+              <a:rPr lang="en-US"/>
+              <a:t>©SoftMoore Consulting</a:t>
+            </a:r>
+          </a:p>
+        </p:txBody>
+      </p:sp>
+      <p:sp>
+        <p:nvSpPr>
+          <p:cNvPr id="5" name="Slide Number Placeholder 4">
+            <a:extLst>
+              <a:ext uri="{FF2B5EF4-FFF2-40B4-BE49-F238E27FC236}">
+                <a16:creationId xmlns:a16="http://schemas.microsoft.com/office/drawing/2014/main" id="{A8847019-DCEF-425F-9CEF-FCFA3A5F60AC}"/>
+              </a:ext>
+            </a:extLst>
+          </p:cNvPr>
+          <p:cNvSpPr>
+            <a:spLocks noGrp="1"/>
+          </p:cNvSpPr>
+          <p:nvPr>
+            <p:ph type="sldNum" sz="quarter" idx="11"/>
+          </p:nvPr>
+        </p:nvSpPr>
+        <p:spPr/>
+        <p:txBody>
+          <a:bodyPr/>
+          <a:lstStyle/>
+          <a:p>
+            <a:pPr>
+              <a:defRPr/>
+            </a:pPr>
+            <a:r>
+              <a:rPr lang="en-US"/>
+              <a:t>Slide </a:t>
+            </a:r>
+            <a:fld id="{4EE36E9E-7C32-43CB-8360-5112C6980E92}" type="slidenum">
+              <a:rPr lang="en-US" smtClean="0"/>
+              <a:pPr>
+                <a:defRPr/>
+              </a:pPr>
+              <a:t>38</a:t>
+            </a:fld>
+            <a:endParaRPr lang="en-US"/>
+          </a:p>
+        </p:txBody>
+      </p:sp>
+    </p:spTree>
+    <p:extLst>
+      <p:ext uri="{BB962C8B-B14F-4D97-AF65-F5344CB8AC3E}">
+        <p14:creationId xmlns:p14="http://schemas.microsoft.com/office/powerpoint/2010/main" val="534995203"/>
+      </p:ext>
+    </p:extLst>
+  </p:cSld>
+  <p:clrMapOvr>
+    <a:masterClrMapping/>
+  </p:clrMapOvr>
+</p:sld>
+</file>
+
+<file path=ppt/slides/slide39.xml><?xml version="1.0" encoding="utf-8"?>
+<p:sld xmlns:a="http://schemas.openxmlformats.org/drawingml/2006/main" xmlns:r="http://schemas.openxmlformats.org/officeDocument/2006/relationships" xmlns:p="http://schemas.openxmlformats.org/presentationml/2006/main">
+  <p:cSld>
+    <p:spTree>
+      <p:nvGrpSpPr>
+        <p:cNvPr id="1" name=""/>
+        <p:cNvGrpSpPr/>
+        <p:nvPr/>
+      </p:nvGrpSpPr>
+      <p:grpSpPr>
+        <a:xfrm>
+          <a:off x="0" y="0"/>
+          <a:ext cx="0" cy="0"/>
+          <a:chOff x="0" y="0"/>
+          <a:chExt cx="0" cy="0"/>
+        </a:xfrm>
+      </p:grpSpPr>
+      <p:sp>
+        <p:nvSpPr>
           <p:cNvPr id="34818" name="Footer Placeholder 3"/>
           <p:cNvSpPr>
             <a:spLocks noGrp="1"/>
@@ -19404,7 +19944,7 @@
             <a:fld id="{B6EB6456-73A5-4637-865C-2C6355BC7308}" type="slidenum">
               <a:rPr lang="en-US" smtClean="0"/>
               <a:pPr/>
-              <a:t>38</a:t>
+              <a:t>39</a:t>
             </a:fld>
             <a:endParaRPr lang="en-US"/>
           </a:p>
@@ -19769,396 +20309,6 @@
                 <a:schemeClr val="tx1"/>
               </a:solidFill>
               <a:round/>
-              <a:headEnd/>
-              <a:tailEnd type="triangle" w="med" len="med"/>
-            </a:ln>
-          </p:spPr>
-        </p:cxnSp>
-      </p:grpSp>
-    </p:spTree>
-  </p:cSld>
-  <p:clrMapOvr>
-    <a:masterClrMapping/>
-  </p:clrMapOvr>
-</p:sld>
-</file>
-
-<file path=ppt/slides/slide39.xml><?xml version="1.0" encoding="utf-8"?>
-<p:sld xmlns:a="http://schemas.openxmlformats.org/drawingml/2006/main" xmlns:r="http://schemas.openxmlformats.org/officeDocument/2006/relationships" xmlns:p="http://schemas.openxmlformats.org/presentationml/2006/main">
-  <p:cSld>
-    <p:spTree>
-      <p:nvGrpSpPr>
-        <p:cNvPr id="1" name=""/>
-        <p:cNvGrpSpPr/>
-        <p:nvPr/>
-      </p:nvGrpSpPr>
-      <p:grpSpPr>
-        <a:xfrm>
-          <a:off x="0" y="0"/>
-          <a:ext cx="0" cy="0"/>
-          <a:chOff x="0" y="0"/>
-          <a:chExt cx="0" cy="0"/>
-        </a:xfrm>
-      </p:grpSpPr>
-      <p:sp>
-        <p:nvSpPr>
-          <p:cNvPr id="35842" name="Footer Placeholder 3"/>
-          <p:cNvSpPr>
-            <a:spLocks noGrp="1"/>
-          </p:cNvSpPr>
-          <p:nvPr>
-            <p:ph type="ftr" sz="quarter" idx="10"/>
-          </p:nvPr>
-        </p:nvSpPr>
-        <p:spPr>
-          <a:noFill/>
-        </p:spPr>
-        <p:txBody>
-          <a:bodyPr/>
-          <a:lstStyle/>
-          <a:p>
-            <a:r>
-              <a:rPr lang="en-US"/>
-              <a:t>©SoftMoore Consulting</a:t>
-            </a:r>
-          </a:p>
-        </p:txBody>
-      </p:sp>
-      <p:sp>
-        <p:nvSpPr>
-          <p:cNvPr id="35843" name="Slide Number Placeholder 4"/>
-          <p:cNvSpPr>
-            <a:spLocks noGrp="1"/>
-          </p:cNvSpPr>
-          <p:nvPr>
-            <p:ph type="sldNum" sz="quarter" idx="11"/>
-          </p:nvPr>
-        </p:nvSpPr>
-        <p:spPr>
-          <a:noFill/>
-        </p:spPr>
-        <p:txBody>
-          <a:bodyPr/>
-          <a:lstStyle/>
-          <a:p>
-            <a:r>
-              <a:rPr lang="en-US"/>
-              <a:t>Slide </a:t>
-            </a:r>
-            <a:fld id="{A37DB1F4-739D-4806-9D54-976A3AB33467}" type="slidenum">
-              <a:rPr lang="en-US" smtClean="0"/>
-              <a:pPr/>
-              <a:t>39</a:t>
-            </a:fld>
-            <a:endParaRPr lang="en-US"/>
-          </a:p>
-        </p:txBody>
-      </p:sp>
-      <p:sp>
-        <p:nvSpPr>
-          <p:cNvPr id="35844" name="Rectangle 3"/>
-          <p:cNvSpPr>
-            <a:spLocks noGrp="1" noChangeArrowheads="1"/>
-          </p:cNvSpPr>
-          <p:nvPr>
-            <p:ph type="body" idx="1"/>
-          </p:nvPr>
-        </p:nvSpPr>
-        <p:spPr/>
-        <p:txBody>
-          <a:bodyPr/>
-          <a:lstStyle/>
-          <a:p>
-            <a:r>
-              <a:rPr lang="en-US" dirty="0"/>
-              <a:t>Example 2: Consider the following grammar for a while statement:</a:t>
-            </a:r>
-            <a:br>
-              <a:rPr lang="en-US" dirty="0"/>
-            </a:br>
-            <a:r>
-              <a:rPr lang="en-US" sz="2800" dirty="0"/>
-              <a:t>   </a:t>
-            </a:r>
-            <a:r>
-              <a:rPr lang="en-US" sz="2000" dirty="0" err="1">
-                <a:latin typeface="Consolas" pitchFamily="49" charset="0"/>
-              </a:rPr>
-              <a:t>whileStmt</a:t>
-            </a:r>
-            <a:r>
-              <a:rPr lang="en-US" sz="2000" dirty="0">
-                <a:latin typeface="Consolas" pitchFamily="49" charset="0"/>
-              </a:rPr>
-              <a:t> = "while" </a:t>
-            </a:r>
-            <a:r>
-              <a:rPr lang="en-US" sz="2000" dirty="0" err="1">
-                <a:latin typeface="Consolas" pitchFamily="49" charset="0"/>
-              </a:rPr>
-              <a:t>booleanExpr</a:t>
-            </a:r>
-            <a:br>
-              <a:rPr lang="en-US" sz="2000" dirty="0">
-                <a:latin typeface="Consolas" pitchFamily="49" charset="0"/>
-              </a:rPr>
-            </a:br>
-            <a:r>
-              <a:rPr lang="en-US" sz="2000" dirty="0">
-                <a:latin typeface="Consolas" pitchFamily="49" charset="0"/>
-              </a:rPr>
-              <a:t>      "loop" statements "end" "loop" ";" .</a:t>
-            </a:r>
-            <a:endParaRPr lang="en-US" sz="2800" dirty="0"/>
-          </a:p>
-          <a:p>
-            <a:r>
-              <a:rPr lang="en-US" dirty="0"/>
-              <a:t>Once a while statement has been parsed, we don’t need to retain the terminal symbols.  The abstract syntax tree for a while statement would contain only </a:t>
-            </a:r>
-            <a:r>
-              <a:rPr lang="en-US" dirty="0" err="1">
-                <a:latin typeface="Consolas" pitchFamily="49" charset="0"/>
-              </a:rPr>
-              <a:t>booleanExpr</a:t>
-            </a:r>
-            <a:r>
-              <a:rPr lang="en-US" dirty="0"/>
-              <a:t> and </a:t>
-            </a:r>
-            <a:r>
-              <a:rPr lang="en-US" dirty="0">
-                <a:latin typeface="Consolas" pitchFamily="49" charset="0"/>
-              </a:rPr>
-              <a:t>statements</a:t>
-            </a:r>
-            <a:r>
-              <a:rPr lang="en-US" dirty="0"/>
-              <a:t>.</a:t>
-            </a:r>
-          </a:p>
-          <a:p>
-            <a:endParaRPr lang="en-US" dirty="0"/>
-          </a:p>
-        </p:txBody>
-      </p:sp>
-      <p:sp>
-        <p:nvSpPr>
-          <p:cNvPr id="35845" name="Rectangle 2"/>
-          <p:cNvSpPr>
-            <a:spLocks noGrp="1" noChangeArrowheads="1"/>
-          </p:cNvSpPr>
-          <p:nvPr>
-            <p:ph type="title"/>
-          </p:nvPr>
-        </p:nvSpPr>
-        <p:spPr/>
-        <p:txBody>
-          <a:bodyPr/>
-          <a:lstStyle/>
-          <a:p>
-            <a:r>
-              <a:rPr lang="en-US" dirty="0"/>
-              <a:t>Abstract Syntax Trees</a:t>
-            </a:r>
-            <a:br>
-              <a:rPr lang="en-US" dirty="0"/>
-            </a:br>
-            <a:r>
-              <a:rPr lang="en-US" sz="2400" dirty="0"/>
-              <a:t>(continued)</a:t>
-            </a:r>
-            <a:endParaRPr lang="en-US" sz="2600" dirty="0"/>
-          </a:p>
-        </p:txBody>
-      </p:sp>
-      <p:grpSp>
-        <p:nvGrpSpPr>
-          <p:cNvPr id="2" name="Group 1"/>
-          <p:cNvGrpSpPr/>
-          <p:nvPr/>
-        </p:nvGrpSpPr>
-        <p:grpSpPr>
-          <a:xfrm>
-            <a:off x="2871614" y="4628448"/>
-            <a:ext cx="3148186" cy="1315152"/>
-            <a:chOff x="2871614" y="4552248"/>
-            <a:chExt cx="3148186" cy="1315152"/>
-          </a:xfrm>
-        </p:grpSpPr>
-        <p:sp>
-          <p:nvSpPr>
-            <p:cNvPr id="35846" name="Text Box 10"/>
-            <p:cNvSpPr txBox="1">
-              <a:spLocks noChangeArrowheads="1"/>
-            </p:cNvSpPr>
-            <p:nvPr/>
-          </p:nvSpPr>
-          <p:spPr bwMode="auto">
-            <a:xfrm>
-              <a:off x="3827534" y="4552248"/>
-              <a:ext cx="1298433" cy="400752"/>
-            </a:xfrm>
-            <a:prstGeom prst="rect">
-              <a:avLst/>
-            </a:prstGeom>
-            <a:noFill/>
-            <a:ln w="9525">
-              <a:noFill/>
-              <a:miter lim="800000"/>
-              <a:headEnd/>
-              <a:tailEnd/>
-            </a:ln>
-          </p:spPr>
-          <p:txBody>
-            <a:bodyPr wrap="none" lIns="92075" tIns="46038" rIns="92075" bIns="46038">
-              <a:spAutoFit/>
-            </a:bodyPr>
-            <a:lstStyle/>
-            <a:p>
-              <a:pPr algn="ctr"/>
-              <a:r>
-                <a:rPr lang="en-US" sz="2000" dirty="0" err="1"/>
-                <a:t>whileStmt</a:t>
-              </a:r>
-              <a:endParaRPr lang="en-US" sz="2000" dirty="0"/>
-            </a:p>
-          </p:txBody>
-        </p:sp>
-        <p:sp>
-          <p:nvSpPr>
-            <p:cNvPr id="35847" name="Text Box 12"/>
-            <p:cNvSpPr txBox="1">
-              <a:spLocks noChangeArrowheads="1"/>
-            </p:cNvSpPr>
-            <p:nvPr/>
-          </p:nvSpPr>
-          <p:spPr bwMode="auto">
-            <a:xfrm>
-              <a:off x="2871614" y="5466648"/>
-              <a:ext cx="1627047" cy="400752"/>
-            </a:xfrm>
-            <a:prstGeom prst="rect">
-              <a:avLst/>
-            </a:prstGeom>
-            <a:noFill/>
-            <a:ln w="9525">
-              <a:noFill/>
-              <a:miter lim="800000"/>
-              <a:headEnd/>
-              <a:tailEnd/>
-            </a:ln>
-          </p:spPr>
-          <p:txBody>
-            <a:bodyPr wrap="none" lIns="92075" tIns="46038" rIns="92075" bIns="46038">
-              <a:spAutoFit/>
-            </a:bodyPr>
-            <a:lstStyle/>
-            <a:p>
-              <a:pPr algn="ctr"/>
-              <a:r>
-                <a:rPr lang="en-US" sz="2000" dirty="0" err="1"/>
-                <a:t>booleanExpr</a:t>
-              </a:r>
-              <a:endParaRPr lang="en-US" sz="2000" dirty="0"/>
-            </a:p>
-          </p:txBody>
-        </p:sp>
-        <p:sp>
-          <p:nvSpPr>
-            <p:cNvPr id="35848" name="Text Box 13"/>
-            <p:cNvSpPr txBox="1">
-              <a:spLocks noChangeArrowheads="1"/>
-            </p:cNvSpPr>
-            <p:nvPr/>
-          </p:nvSpPr>
-          <p:spPr bwMode="auto">
-            <a:xfrm>
-              <a:off x="4581906" y="5466648"/>
-              <a:ext cx="1437894" cy="400752"/>
-            </a:xfrm>
-            <a:prstGeom prst="rect">
-              <a:avLst/>
-            </a:prstGeom>
-            <a:noFill/>
-            <a:ln w="9525">
-              <a:noFill/>
-              <a:miter lim="800000"/>
-              <a:headEnd/>
-              <a:tailEnd/>
-            </a:ln>
-          </p:spPr>
-          <p:txBody>
-            <a:bodyPr wrap="none" lIns="92075" tIns="46038" rIns="92075" bIns="46038">
-              <a:spAutoFit/>
-            </a:bodyPr>
-            <a:lstStyle/>
-            <a:p>
-              <a:pPr algn="ctr"/>
-              <a:r>
-                <a:rPr lang="en-US" sz="2000" dirty="0"/>
-                <a:t>statements</a:t>
-              </a:r>
-            </a:p>
-          </p:txBody>
-        </p:sp>
-        <p:cxnSp>
-          <p:nvCxnSpPr>
-            <p:cNvPr id="35849" name="AutoShape 22"/>
-            <p:cNvCxnSpPr>
-              <a:cxnSpLocks noChangeShapeType="1"/>
-              <a:stCxn id="35846" idx="2"/>
-              <a:endCxn id="35847" idx="0"/>
-            </p:cNvCxnSpPr>
-            <p:nvPr/>
-          </p:nvCxnSpPr>
-          <p:spPr bwMode="auto">
-            <a:xfrm rot="5400000">
-              <a:off x="3824121" y="4814018"/>
-              <a:ext cx="513648" cy="791613"/>
-            </a:xfrm>
-            <a:prstGeom prst="bentConnector3">
-              <a:avLst>
-                <a:gd name="adj1" fmla="val 50000"/>
-              </a:avLst>
-            </a:prstGeom>
-            <a:noFill/>
-            <a:ln w="9525">
-              <a:solidFill>
-                <a:schemeClr val="tx1"/>
-              </a:solidFill>
-              <a:miter lim="800000"/>
-              <a:headEnd/>
-              <a:tailEnd type="triangle" w="med" len="med"/>
-            </a:ln>
-          </p:spPr>
-        </p:cxnSp>
-        <p:cxnSp>
-          <p:nvCxnSpPr>
-            <p:cNvPr id="35850" name="AutoShape 23"/>
-            <p:cNvCxnSpPr>
-              <a:cxnSpLocks noChangeShapeType="1"/>
-              <a:stCxn id="35846" idx="2"/>
-              <a:endCxn id="35848" idx="0"/>
-            </p:cNvCxnSpPr>
-            <p:nvPr/>
-          </p:nvCxnSpPr>
-          <p:spPr bwMode="auto">
-            <a:xfrm rot="16200000" flipH="1">
-              <a:off x="4631978" y="4797773"/>
-              <a:ext cx="513648" cy="824102"/>
-            </a:xfrm>
-            <a:prstGeom prst="bentConnector3">
-              <a:avLst>
-                <a:gd name="adj1" fmla="val 50000"/>
-              </a:avLst>
-            </a:prstGeom>
-            <a:noFill/>
-            <a:ln w="9525">
-              <a:solidFill>
-                <a:schemeClr val="tx1"/>
-              </a:solidFill>
-              <a:miter lim="800000"/>
               <a:headEnd/>
               <a:tailEnd type="triangle" w="med" len="med"/>
             </a:ln>
@@ -20614,7 +20764,7 @@
       </p:grpSpPr>
       <p:sp>
         <p:nvSpPr>
-          <p:cNvPr id="27650" name="Footer Placeholder 3"/>
+          <p:cNvPr id="35842" name="Footer Placeholder 3"/>
           <p:cNvSpPr>
             <a:spLocks noGrp="1"/>
           </p:cNvSpPr>
@@ -20638,7 +20788,7 @@
       </p:sp>
       <p:sp>
         <p:nvSpPr>
-          <p:cNvPr id="27651" name="Slide Number Placeholder 4"/>
+          <p:cNvPr id="35843" name="Slide Number Placeholder 4"/>
           <p:cNvSpPr>
             <a:spLocks noGrp="1"/>
           </p:cNvSpPr>
@@ -20657,10 +20807,400 @@
               <a:rPr lang="en-US"/>
               <a:t>Slide </a:t>
             </a:r>
+            <a:fld id="{A37DB1F4-739D-4806-9D54-976A3AB33467}" type="slidenum">
+              <a:rPr lang="en-US" smtClean="0"/>
+              <a:pPr/>
+              <a:t>40</a:t>
+            </a:fld>
+            <a:endParaRPr lang="en-US"/>
+          </a:p>
+        </p:txBody>
+      </p:sp>
+      <p:sp>
+        <p:nvSpPr>
+          <p:cNvPr id="35844" name="Rectangle 3"/>
+          <p:cNvSpPr>
+            <a:spLocks noGrp="1" noChangeArrowheads="1"/>
+          </p:cNvSpPr>
+          <p:nvPr>
+            <p:ph type="body" idx="1"/>
+          </p:nvPr>
+        </p:nvSpPr>
+        <p:spPr/>
+        <p:txBody>
+          <a:bodyPr/>
+          <a:lstStyle/>
+          <a:p>
+            <a:r>
+              <a:rPr lang="en-US" dirty="0"/>
+              <a:t>Example 2: Consider the following grammar for a while statement:</a:t>
+            </a:r>
+            <a:br>
+              <a:rPr lang="en-US" dirty="0"/>
+            </a:br>
+            <a:r>
+              <a:rPr lang="en-US" sz="2800" dirty="0"/>
+              <a:t>   </a:t>
+            </a:r>
+            <a:r>
+              <a:rPr lang="en-US" sz="2000" dirty="0" err="1">
+                <a:latin typeface="Consolas" pitchFamily="49" charset="0"/>
+              </a:rPr>
+              <a:t>whileStmt</a:t>
+            </a:r>
+            <a:r>
+              <a:rPr lang="en-US" sz="2000" dirty="0">
+                <a:latin typeface="Consolas" pitchFamily="49" charset="0"/>
+              </a:rPr>
+              <a:t> = "while" </a:t>
+            </a:r>
+            <a:r>
+              <a:rPr lang="en-US" sz="2000" dirty="0" err="1">
+                <a:latin typeface="Consolas" pitchFamily="49" charset="0"/>
+              </a:rPr>
+              <a:t>booleanExpr</a:t>
+            </a:r>
+            <a:br>
+              <a:rPr lang="en-US" sz="2000" dirty="0">
+                <a:latin typeface="Consolas" pitchFamily="49" charset="0"/>
+              </a:rPr>
+            </a:br>
+            <a:r>
+              <a:rPr lang="en-US" sz="2000" dirty="0">
+                <a:latin typeface="Consolas" pitchFamily="49" charset="0"/>
+              </a:rPr>
+              <a:t>      "loop" statements "end" "loop" ";" .</a:t>
+            </a:r>
+            <a:endParaRPr lang="en-US" sz="2800" dirty="0"/>
+          </a:p>
+          <a:p>
+            <a:r>
+              <a:rPr lang="en-US" dirty="0"/>
+              <a:t>Once a while statement has been parsed, we don’t need to retain the terminal symbols.  The abstract syntax tree for a while statement would contain only </a:t>
+            </a:r>
+            <a:r>
+              <a:rPr lang="en-US" dirty="0" err="1">
+                <a:latin typeface="Consolas" pitchFamily="49" charset="0"/>
+              </a:rPr>
+              <a:t>booleanExpr</a:t>
+            </a:r>
+            <a:r>
+              <a:rPr lang="en-US" dirty="0"/>
+              <a:t> and </a:t>
+            </a:r>
+            <a:r>
+              <a:rPr lang="en-US" dirty="0">
+                <a:latin typeface="Consolas" pitchFamily="49" charset="0"/>
+              </a:rPr>
+              <a:t>statements</a:t>
+            </a:r>
+            <a:r>
+              <a:rPr lang="en-US" dirty="0"/>
+              <a:t>.</a:t>
+            </a:r>
+          </a:p>
+          <a:p>
+            <a:endParaRPr lang="en-US" dirty="0"/>
+          </a:p>
+        </p:txBody>
+      </p:sp>
+      <p:sp>
+        <p:nvSpPr>
+          <p:cNvPr id="35845" name="Rectangle 2"/>
+          <p:cNvSpPr>
+            <a:spLocks noGrp="1" noChangeArrowheads="1"/>
+          </p:cNvSpPr>
+          <p:nvPr>
+            <p:ph type="title"/>
+          </p:nvPr>
+        </p:nvSpPr>
+        <p:spPr/>
+        <p:txBody>
+          <a:bodyPr/>
+          <a:lstStyle/>
+          <a:p>
+            <a:r>
+              <a:rPr lang="en-US" dirty="0"/>
+              <a:t>Abstract Syntax Trees</a:t>
+            </a:r>
+            <a:br>
+              <a:rPr lang="en-US" dirty="0"/>
+            </a:br>
+            <a:r>
+              <a:rPr lang="en-US" sz="2400" dirty="0"/>
+              <a:t>(continued)</a:t>
+            </a:r>
+            <a:endParaRPr lang="en-US" sz="2600" dirty="0"/>
+          </a:p>
+        </p:txBody>
+      </p:sp>
+      <p:grpSp>
+        <p:nvGrpSpPr>
+          <p:cNvPr id="2" name="Group 1"/>
+          <p:cNvGrpSpPr/>
+          <p:nvPr/>
+        </p:nvGrpSpPr>
+        <p:grpSpPr>
+          <a:xfrm>
+            <a:off x="2871614" y="4628448"/>
+            <a:ext cx="3148186" cy="1315152"/>
+            <a:chOff x="2871614" y="4552248"/>
+            <a:chExt cx="3148186" cy="1315152"/>
+          </a:xfrm>
+        </p:grpSpPr>
+        <p:sp>
+          <p:nvSpPr>
+            <p:cNvPr id="35846" name="Text Box 10"/>
+            <p:cNvSpPr txBox="1">
+              <a:spLocks noChangeArrowheads="1"/>
+            </p:cNvSpPr>
+            <p:nvPr/>
+          </p:nvSpPr>
+          <p:spPr bwMode="auto">
+            <a:xfrm>
+              <a:off x="3827534" y="4552248"/>
+              <a:ext cx="1298433" cy="400752"/>
+            </a:xfrm>
+            <a:prstGeom prst="rect">
+              <a:avLst/>
+            </a:prstGeom>
+            <a:noFill/>
+            <a:ln w="9525">
+              <a:noFill/>
+              <a:miter lim="800000"/>
+              <a:headEnd/>
+              <a:tailEnd/>
+            </a:ln>
+          </p:spPr>
+          <p:txBody>
+            <a:bodyPr wrap="none" lIns="92075" tIns="46038" rIns="92075" bIns="46038">
+              <a:spAutoFit/>
+            </a:bodyPr>
+            <a:lstStyle/>
+            <a:p>
+              <a:pPr algn="ctr"/>
+              <a:r>
+                <a:rPr lang="en-US" sz="2000" dirty="0" err="1"/>
+                <a:t>whileStmt</a:t>
+              </a:r>
+              <a:endParaRPr lang="en-US" sz="2000" dirty="0"/>
+            </a:p>
+          </p:txBody>
+        </p:sp>
+        <p:sp>
+          <p:nvSpPr>
+            <p:cNvPr id="35847" name="Text Box 12"/>
+            <p:cNvSpPr txBox="1">
+              <a:spLocks noChangeArrowheads="1"/>
+            </p:cNvSpPr>
+            <p:nvPr/>
+          </p:nvSpPr>
+          <p:spPr bwMode="auto">
+            <a:xfrm>
+              <a:off x="2871614" y="5466648"/>
+              <a:ext cx="1627047" cy="400752"/>
+            </a:xfrm>
+            <a:prstGeom prst="rect">
+              <a:avLst/>
+            </a:prstGeom>
+            <a:noFill/>
+            <a:ln w="9525">
+              <a:noFill/>
+              <a:miter lim="800000"/>
+              <a:headEnd/>
+              <a:tailEnd/>
+            </a:ln>
+          </p:spPr>
+          <p:txBody>
+            <a:bodyPr wrap="none" lIns="92075" tIns="46038" rIns="92075" bIns="46038">
+              <a:spAutoFit/>
+            </a:bodyPr>
+            <a:lstStyle/>
+            <a:p>
+              <a:pPr algn="ctr"/>
+              <a:r>
+                <a:rPr lang="en-US" sz="2000" dirty="0" err="1"/>
+                <a:t>booleanExpr</a:t>
+              </a:r>
+              <a:endParaRPr lang="en-US" sz="2000" dirty="0"/>
+            </a:p>
+          </p:txBody>
+        </p:sp>
+        <p:sp>
+          <p:nvSpPr>
+            <p:cNvPr id="35848" name="Text Box 13"/>
+            <p:cNvSpPr txBox="1">
+              <a:spLocks noChangeArrowheads="1"/>
+            </p:cNvSpPr>
+            <p:nvPr/>
+          </p:nvSpPr>
+          <p:spPr bwMode="auto">
+            <a:xfrm>
+              <a:off x="4581906" y="5466648"/>
+              <a:ext cx="1437894" cy="400752"/>
+            </a:xfrm>
+            <a:prstGeom prst="rect">
+              <a:avLst/>
+            </a:prstGeom>
+            <a:noFill/>
+            <a:ln w="9525">
+              <a:noFill/>
+              <a:miter lim="800000"/>
+              <a:headEnd/>
+              <a:tailEnd/>
+            </a:ln>
+          </p:spPr>
+          <p:txBody>
+            <a:bodyPr wrap="none" lIns="92075" tIns="46038" rIns="92075" bIns="46038">
+              <a:spAutoFit/>
+            </a:bodyPr>
+            <a:lstStyle/>
+            <a:p>
+              <a:pPr algn="ctr"/>
+              <a:r>
+                <a:rPr lang="en-US" sz="2000" dirty="0"/>
+                <a:t>statements</a:t>
+              </a:r>
+            </a:p>
+          </p:txBody>
+        </p:sp>
+        <p:cxnSp>
+          <p:nvCxnSpPr>
+            <p:cNvPr id="35849" name="AutoShape 22"/>
+            <p:cNvCxnSpPr>
+              <a:cxnSpLocks noChangeShapeType="1"/>
+              <a:stCxn id="35846" idx="2"/>
+              <a:endCxn id="35847" idx="0"/>
+            </p:cNvCxnSpPr>
+            <p:nvPr/>
+          </p:nvCxnSpPr>
+          <p:spPr bwMode="auto">
+            <a:xfrm rot="5400000">
+              <a:off x="3824121" y="4814018"/>
+              <a:ext cx="513648" cy="791613"/>
+            </a:xfrm>
+            <a:prstGeom prst="bentConnector3">
+              <a:avLst>
+                <a:gd name="adj1" fmla="val 50000"/>
+              </a:avLst>
+            </a:prstGeom>
+            <a:noFill/>
+            <a:ln w="9525">
+              <a:solidFill>
+                <a:schemeClr val="tx1"/>
+              </a:solidFill>
+              <a:miter lim="800000"/>
+              <a:headEnd/>
+              <a:tailEnd type="triangle" w="med" len="med"/>
+            </a:ln>
+          </p:spPr>
+        </p:cxnSp>
+        <p:cxnSp>
+          <p:nvCxnSpPr>
+            <p:cNvPr id="35850" name="AutoShape 23"/>
+            <p:cNvCxnSpPr>
+              <a:cxnSpLocks noChangeShapeType="1"/>
+              <a:stCxn id="35846" idx="2"/>
+              <a:endCxn id="35848" idx="0"/>
+            </p:cNvCxnSpPr>
+            <p:nvPr/>
+          </p:nvCxnSpPr>
+          <p:spPr bwMode="auto">
+            <a:xfrm rot="16200000" flipH="1">
+              <a:off x="4631978" y="4797773"/>
+              <a:ext cx="513648" cy="824102"/>
+            </a:xfrm>
+            <a:prstGeom prst="bentConnector3">
+              <a:avLst>
+                <a:gd name="adj1" fmla="val 50000"/>
+              </a:avLst>
+            </a:prstGeom>
+            <a:noFill/>
+            <a:ln w="9525">
+              <a:solidFill>
+                <a:schemeClr val="tx1"/>
+              </a:solidFill>
+              <a:miter lim="800000"/>
+              <a:headEnd/>
+              <a:tailEnd type="triangle" w="med" len="med"/>
+            </a:ln>
+          </p:spPr>
+        </p:cxnSp>
+      </p:grpSp>
+    </p:spTree>
+  </p:cSld>
+  <p:clrMapOvr>
+    <a:masterClrMapping/>
+  </p:clrMapOvr>
+</p:sld>
+</file>
+
+<file path=ppt/slides/slide41.xml><?xml version="1.0" encoding="utf-8"?>
+<p:sld xmlns:a="http://schemas.openxmlformats.org/drawingml/2006/main" xmlns:r="http://schemas.openxmlformats.org/officeDocument/2006/relationships" xmlns:p="http://schemas.openxmlformats.org/presentationml/2006/main">
+  <p:cSld>
+    <p:spTree>
+      <p:nvGrpSpPr>
+        <p:cNvPr id="1" name=""/>
+        <p:cNvGrpSpPr/>
+        <p:nvPr/>
+      </p:nvGrpSpPr>
+      <p:grpSpPr>
+        <a:xfrm>
+          <a:off x="0" y="0"/>
+          <a:ext cx="0" cy="0"/>
+          <a:chOff x="0" y="0"/>
+          <a:chExt cx="0" cy="0"/>
+        </a:xfrm>
+      </p:grpSpPr>
+      <p:sp>
+        <p:nvSpPr>
+          <p:cNvPr id="27650" name="Footer Placeholder 3"/>
+          <p:cNvSpPr>
+            <a:spLocks noGrp="1"/>
+          </p:cNvSpPr>
+          <p:nvPr>
+            <p:ph type="ftr" sz="quarter" idx="10"/>
+          </p:nvPr>
+        </p:nvSpPr>
+        <p:spPr>
+          <a:noFill/>
+        </p:spPr>
+        <p:txBody>
+          <a:bodyPr/>
+          <a:lstStyle/>
+          <a:p>
+            <a:r>
+              <a:rPr lang="en-US"/>
+              <a:t>©SoftMoore Consulting</a:t>
+            </a:r>
+          </a:p>
+        </p:txBody>
+      </p:sp>
+      <p:sp>
+        <p:nvSpPr>
+          <p:cNvPr id="27651" name="Slide Number Placeholder 4"/>
+          <p:cNvSpPr>
+            <a:spLocks noGrp="1"/>
+          </p:cNvSpPr>
+          <p:nvPr>
+            <p:ph type="sldNum" sz="quarter" idx="11"/>
+          </p:nvPr>
+        </p:nvSpPr>
+        <p:spPr>
+          <a:noFill/>
+        </p:spPr>
+        <p:txBody>
+          <a:bodyPr/>
+          <a:lstStyle/>
+          <a:p>
+            <a:r>
+              <a:rPr lang="en-US"/>
+              <a:t>Slide </a:t>
+            </a:r>
             <a:fld id="{8C06D682-BCCA-45CA-AF19-CA2A6A9B3EE1}" type="slidenum">
               <a:rPr lang="en-US" smtClean="0"/>
               <a:pPr/>
-              <a:t>40</a:t>
+              <a:t>41</a:t>
             </a:fld>
             <a:endParaRPr lang="en-US"/>
           </a:p>

</xml_diff>

<commit_message>
minor corrections to PowerPoint slides
</commit_message>
<xml_diff>
--- a/PowerPoint Slides/03 - Context-Free Grammars.pptx
+++ b/PowerPoint Slides/03 - Context-Free Grammars.pptx
@@ -14708,7 +14708,19 @@
               <a:rPr lang="en-US" sz="1800" dirty="0">
                 <a:latin typeface="Consolas" panose="020B0609020204030204" pitchFamily="49" charset="0"/>
               </a:rPr>
-              <a:t>     =&gt; expr op expr op expr</a:t>
+              <a:t>     =&gt; </a:t>
+            </a:r>
+            <a:r>
+              <a:rPr lang="en-US" sz="1800" u="sng" dirty="0">
+                <a:latin typeface="Consolas" panose="020B0609020204030204" pitchFamily="49" charset="0"/>
+              </a:rPr>
+              <a:t>expr</a:t>
+            </a:r>
+            <a:r>
+              <a:rPr lang="en-US" sz="1800" dirty="0">
+                <a:latin typeface="Consolas" panose="020B0609020204030204" pitchFamily="49" charset="0"/>
+              </a:rPr>
+              <a:t> op expr op expr</a:t>
             </a:r>
           </a:p>
           <a:p>
@@ -15106,7 +15118,7 @@
         </p:nvGrpSpPr>
         <p:grpSpPr>
           <a:xfrm>
-            <a:off x="809625" y="2298427"/>
+            <a:off x="809625" y="2209800"/>
             <a:ext cx="7524750" cy="3873773"/>
             <a:chOff x="2324100" y="1131957"/>
             <a:chExt cx="7524750" cy="3873773"/>

</xml_diff>